<commit_message>
minor edits to first half
</commit_message>
<xml_diff>
--- a/presentation.pptx
+++ b/presentation.pptx
@@ -13,8 +13,8 @@
   <p:sldIdLst>
     <p:sldId id="256" r:id="rId2"/>
     <p:sldId id="259" r:id="rId3"/>
-    <p:sldId id="263" r:id="rId4"/>
-    <p:sldId id="262" r:id="rId5"/>
+    <p:sldId id="262" r:id="rId4"/>
+    <p:sldId id="263" r:id="rId5"/>
     <p:sldId id="260" r:id="rId6"/>
     <p:sldId id="261" r:id="rId7"/>
     <p:sldId id="264" r:id="rId8"/>
@@ -1314,7 +1314,23 @@
             </a:pPr>
             <a:r>
               <a:rPr lang="en-GB" dirty="0" smtClean="0"/>
-              <a:t>Expand on black/white board. Show binary string representation and rotational</a:t>
+              <a:t>Expand on black/white board. Show binary string </a:t>
+            </a:r>
+            <a:r>
+              <a:rPr lang="en-GB" dirty="0" smtClean="0"/>
+              <a:t>representation (</a:t>
+            </a:r>
+            <a:r>
+              <a:rPr lang="en-GB" dirty="0" err="1" smtClean="0"/>
+              <a:t>dec</a:t>
+            </a:r>
+            <a:r>
+              <a:rPr lang="en-GB" dirty="0" smtClean="0"/>
+              <a:t> 203, rot 151) </a:t>
+            </a:r>
+            <a:r>
+              <a:rPr lang="en-GB" dirty="0" smtClean="0"/>
+              <a:t>and rotational</a:t>
             </a:r>
             <a:r>
               <a:rPr lang="en-GB" baseline="0" dirty="0" smtClean="0"/>
@@ -1345,7 +1361,7 @@
             <a:fld id="{E36643B1-9D94-4426-9F70-001B837290C8}" type="slidenum">
               <a:rPr lang="sv-SE" smtClean="0"/>
               <a:pPr/>
-              <a:t>3</a:t>
+              <a:t>4</a:t>
             </a:fld>
             <a:endParaRPr lang="sv-SE"/>
           </a:p>
@@ -5617,93 +5633,510 @@
   <p:timing>
     <p:tnLst>
       <p:par>
-        <p:cTn id="1" dur="indefinite" restart="never" nodeType="tmRoot">
-          <p:childTnLst>
-            <p:seq concurrent="1" nextAc="seek">
-              <p:cTn id="2" dur="indefinite" nodeType="mainSeq">
-                <p:childTnLst>
-                  <p:par>
-                    <p:cTn id="3" fill="hold">
-                      <p:stCondLst>
-                        <p:cond delay="indefinite"/>
-                      </p:stCondLst>
-                      <p:childTnLst>
-                        <p:par>
-                          <p:cTn id="4" fill="hold">
-                            <p:stCondLst>
-                              <p:cond delay="0"/>
-                            </p:stCondLst>
-                            <p:childTnLst>
-                              <p:par>
-                                <p:cTn id="5" presetID="10" presetClass="entr" presetSubtype="0" fill="hold" grpId="0" nodeType="clickEffect">
-                                  <p:stCondLst>
-                                    <p:cond delay="0"/>
-                                  </p:stCondLst>
-                                  <p:childTnLst>
-                                    <p:set>
-                                      <p:cBhvr>
-                                        <p:cTn id="6" dur="1" fill="hold">
-                                          <p:stCondLst>
-                                            <p:cond delay="0"/>
-                                          </p:stCondLst>
-                                        </p:cTn>
-                                        <p:tgtEl>
-                                          <p:spTgt spid="4"/>
-                                        </p:tgtEl>
-                                        <p:attrNameLst>
-                                          <p:attrName>style.visibility</p:attrName>
-                                        </p:attrNameLst>
-                                      </p:cBhvr>
-                                      <p:to>
-                                        <p:strVal val="visible"/>
-                                      </p:to>
-                                    </p:set>
-                                    <p:animEffect transition="in" filter="fade">
-                                      <p:cBhvr>
-                                        <p:cTn id="7" dur="500"/>
-                                        <p:tgtEl>
-                                          <p:spTgt spid="4"/>
-                                        </p:tgtEl>
-                                      </p:cBhvr>
-                                    </p:animEffect>
-                                  </p:childTnLst>
-                                </p:cTn>
-                              </p:par>
-                            </p:childTnLst>
-                          </p:cTn>
-                        </p:par>
-                      </p:childTnLst>
-                    </p:cTn>
-                  </p:par>
-                </p:childTnLst>
-              </p:cTn>
-              <p:prevCondLst>
-                <p:cond evt="onPrev" delay="0">
-                  <p:tgtEl>
-                    <p:sldTgt/>
-                  </p:tgtEl>
-                </p:cond>
-              </p:prevCondLst>
-              <p:nextCondLst>
-                <p:cond evt="onNext" delay="0">
-                  <p:tgtEl>
-                    <p:sldTgt/>
-                  </p:tgtEl>
-                </p:cond>
-              </p:nextCondLst>
-            </p:seq>
-          </p:childTnLst>
-        </p:cTn>
+        <p:cTn id="1" dur="indefinite" restart="never" nodeType="tmRoot"/>
       </p:par>
     </p:tnLst>
-    <p:bldLst>
-      <p:bldP spid="4" grpId="0"/>
-    </p:bldLst>
   </p:timing>
 </p:sld>
 </file>
 
 <file path=ppt/slides/slide3.xml><?xml version="1.0" encoding="utf-8"?>
+<p:sld xmlns:a="http://schemas.openxmlformats.org/drawingml/2006/main" xmlns:r="http://schemas.openxmlformats.org/officeDocument/2006/relationships" xmlns:p="http://schemas.openxmlformats.org/presentationml/2006/main">
+  <p:cSld>
+    <p:spTree>
+      <p:nvGrpSpPr>
+        <p:cNvPr id="1" name=""/>
+        <p:cNvGrpSpPr/>
+        <p:nvPr/>
+      </p:nvGrpSpPr>
+      <p:grpSpPr>
+        <a:xfrm>
+          <a:off x="0" y="0"/>
+          <a:ext cx="0" cy="0"/>
+          <a:chOff x="0" y="0"/>
+          <a:chExt cx="0" cy="0"/>
+        </a:xfrm>
+      </p:grpSpPr>
+      <p:sp>
+        <p:nvSpPr>
+          <p:cNvPr id="2" name="Title 1"/>
+          <p:cNvSpPr>
+            <a:spLocks noGrp="1"/>
+          </p:cNvSpPr>
+          <p:nvPr>
+            <p:ph type="title"/>
+          </p:nvPr>
+        </p:nvSpPr>
+        <p:spPr/>
+        <p:txBody>
+          <a:bodyPr/>
+          <a:lstStyle/>
+          <a:p>
+            <a:r>
+              <a:rPr lang="sv-SE" sz="14400" dirty="0" smtClean="0"/>
+              <a:t>Data</a:t>
+            </a:r>
+            <a:endParaRPr lang="en-GB" sz="14400" dirty="0"/>
+          </a:p>
+        </p:txBody>
+      </p:sp>
+      <p:sp>
+        <p:nvSpPr>
+          <p:cNvPr id="3" name="Content Placeholder 2"/>
+          <p:cNvSpPr>
+            <a:spLocks noGrp="1"/>
+          </p:cNvSpPr>
+          <p:nvPr>
+            <p:ph idx="1"/>
+          </p:nvPr>
+        </p:nvSpPr>
+        <p:spPr>
+          <a:xfrm>
+            <a:off x="7126661" y="4031829"/>
+            <a:ext cx="27779663" cy="17280260"/>
+          </a:xfrm>
+        </p:spPr>
+        <p:txBody>
+          <a:bodyPr/>
+          <a:lstStyle/>
+          <a:p>
+            <a:r>
+              <a:rPr lang="sv-SE" dirty="0" smtClean="0"/>
+              <a:t>10274 80x80 images (75% healthy)</a:t>
+            </a:r>
+          </a:p>
+          <a:p>
+            <a:r>
+              <a:rPr lang="sv-SE" dirty="0" smtClean="0"/>
+              <a:t>Cells sampled from patients mouth</a:t>
+            </a:r>
+          </a:p>
+          <a:p>
+            <a:r>
+              <a:rPr lang="sv-SE" dirty="0" smtClean="0"/>
+              <a:t>Three healthy patients, three with cancer</a:t>
+            </a:r>
+          </a:p>
+          <a:p>
+            <a:r>
+              <a:rPr lang="sv-SE" dirty="0" smtClean="0"/>
+              <a:t>Ground truth on patient level, not cell level</a:t>
+            </a:r>
+            <a:endParaRPr lang="en-GB" dirty="0"/>
+          </a:p>
+        </p:txBody>
+      </p:sp>
+      <p:pic>
+        <p:nvPicPr>
+          <p:cNvPr id="2051" name="Picture 3" descr="C:\Users\Bulb\Documents\Teknisk Fysik\15hp project\code\data\glass_3_im_85.jpg"/>
+          <p:cNvPicPr>
+            <a:picLocks noChangeAspect="1" noChangeArrowheads="1"/>
+          </p:cNvPicPr>
+          <p:nvPr/>
+        </p:nvPicPr>
+        <p:blipFill>
+          <a:blip r:embed="rId2">
+            <a:extLst>
+              <a:ext uri="{28A0092B-C50C-407E-A947-70E740481C1C}">
+                <a14:useLocalDpi xmlns:a14="http://schemas.microsoft.com/office/drawing/2010/main" val="0"/>
+              </a:ext>
+            </a:extLst>
+          </a:blip>
+          <a:srcRect/>
+          <a:stretch>
+            <a:fillRect/>
+          </a:stretch>
+        </p:blipFill>
+        <p:spPr bwMode="auto">
+          <a:xfrm>
+            <a:off x="8198002" y="17597955"/>
+            <a:ext cx="4873771" cy="4908037"/>
+          </a:xfrm>
+          <a:prstGeom prst="rect">
+            <a:avLst/>
+          </a:prstGeom>
+          <a:noFill/>
+          <a:extLst>
+            <a:ext uri="{909E8E84-426E-40DD-AFC4-6F175D3DCCD1}">
+              <a14:hiddenFill xmlns:a14="http://schemas.microsoft.com/office/drawing/2010/main">
+                <a:solidFill>
+                  <a:srgbClr val="FFFFFF"/>
+                </a:solidFill>
+              </a14:hiddenFill>
+            </a:ext>
+          </a:extLst>
+        </p:spPr>
+      </p:pic>
+      <p:pic>
+        <p:nvPicPr>
+          <p:cNvPr id="2052" name="Picture 4" descr="C:\Users\Bulb\Documents\Teknisk Fysik\15hp project\code\data\glass_3_im_200.jpg"/>
+          <p:cNvPicPr>
+            <a:picLocks noChangeAspect="1" noChangeArrowheads="1"/>
+          </p:cNvPicPr>
+          <p:nvPr/>
+        </p:nvPicPr>
+        <p:blipFill>
+          <a:blip r:embed="rId3">
+            <a:extLst>
+              <a:ext uri="{28A0092B-C50C-407E-A947-70E740481C1C}">
+                <a14:useLocalDpi xmlns:a14="http://schemas.microsoft.com/office/drawing/2010/main" val="0"/>
+              </a:ext>
+            </a:extLst>
+          </a:blip>
+          <a:srcRect/>
+          <a:stretch>
+            <a:fillRect/>
+          </a:stretch>
+        </p:blipFill>
+        <p:spPr bwMode="auto">
+          <a:xfrm>
+            <a:off x="13647838" y="17576342"/>
+            <a:ext cx="4873771" cy="4905322"/>
+          </a:xfrm>
+          <a:prstGeom prst="rect">
+            <a:avLst/>
+          </a:prstGeom>
+          <a:noFill/>
+          <a:extLst>
+            <a:ext uri="{909E8E84-426E-40DD-AFC4-6F175D3DCCD1}">
+              <a14:hiddenFill xmlns:a14="http://schemas.microsoft.com/office/drawing/2010/main">
+                <a:solidFill>
+                  <a:srgbClr val="FFFFFF"/>
+                </a:solidFill>
+              </a14:hiddenFill>
+            </a:ext>
+          </a:extLst>
+        </p:spPr>
+      </p:pic>
+      <p:pic>
+        <p:nvPicPr>
+          <p:cNvPr id="2053" name="Picture 5" descr="C:\Users\Bulb\Documents\Teknisk Fysik\15hp project\code\data\glass_3_im_1000.jpg"/>
+          <p:cNvPicPr>
+            <a:picLocks noChangeAspect="1" noChangeArrowheads="1"/>
+          </p:cNvPicPr>
+          <p:nvPr/>
+        </p:nvPicPr>
+        <p:blipFill>
+          <a:blip r:embed="rId4">
+            <a:extLst>
+              <a:ext uri="{28A0092B-C50C-407E-A947-70E740481C1C}">
+                <a14:useLocalDpi xmlns:a14="http://schemas.microsoft.com/office/drawing/2010/main" val="0"/>
+              </a:ext>
+            </a:extLst>
+          </a:blip>
+          <a:srcRect/>
+          <a:stretch>
+            <a:fillRect/>
+          </a:stretch>
+        </p:blipFill>
+        <p:spPr bwMode="auto">
+          <a:xfrm>
+            <a:off x="8141429" y="12083349"/>
+            <a:ext cx="4905322" cy="5021884"/>
+          </a:xfrm>
+          <a:prstGeom prst="rect">
+            <a:avLst/>
+          </a:prstGeom>
+          <a:noFill/>
+          <a:extLst>
+            <a:ext uri="{909E8E84-426E-40DD-AFC4-6F175D3DCCD1}">
+              <a14:hiddenFill xmlns:a14="http://schemas.microsoft.com/office/drawing/2010/main">
+                <a:solidFill>
+                  <a:srgbClr val="FFFFFF"/>
+                </a:solidFill>
+              </a14:hiddenFill>
+            </a:ext>
+          </a:extLst>
+        </p:spPr>
+      </p:pic>
+      <p:sp>
+        <p:nvSpPr>
+          <p:cNvPr id="4" name="TextBox 3"/>
+          <p:cNvSpPr txBox="1"/>
+          <p:nvPr/>
+        </p:nvSpPr>
+        <p:spPr>
+          <a:xfrm>
+            <a:off x="8141429" y="23256138"/>
+            <a:ext cx="10411732" cy="1169551"/>
+          </a:xfrm>
+          <a:prstGeom prst="rect">
+            <a:avLst/>
+          </a:prstGeom>
+          <a:noFill/>
+        </p:spPr>
+        <p:txBody>
+          <a:bodyPr wrap="square" rtlCol="0">
+            <a:spAutoFit/>
+          </a:bodyPr>
+          <a:lstStyle/>
+          <a:p>
+            <a:pPr algn="ctr"/>
+            <a:r>
+              <a:rPr lang="sv-SE" sz="7000" b="1" dirty="0" smtClean="0"/>
+              <a:t>Healthy Cells</a:t>
+            </a:r>
+            <a:endParaRPr lang="en-GB" sz="7000" b="1" dirty="0"/>
+          </a:p>
+        </p:txBody>
+      </p:sp>
+      <p:pic>
+        <p:nvPicPr>
+          <p:cNvPr id="2057" name="Picture 9" descr="C:\Users\Bulb\Documents\Teknisk Fysik\15hp project\code\data\glass_12_im_50.jpg"/>
+          <p:cNvPicPr>
+            <a:picLocks noChangeAspect="1" noChangeArrowheads="1"/>
+          </p:cNvPicPr>
+          <p:nvPr/>
+        </p:nvPicPr>
+        <p:blipFill>
+          <a:blip r:embed="rId5">
+            <a:extLst>
+              <a:ext uri="{28A0092B-C50C-407E-A947-70E740481C1C}">
+                <a14:useLocalDpi xmlns:a14="http://schemas.microsoft.com/office/drawing/2010/main" val="0"/>
+              </a:ext>
+            </a:extLst>
+          </a:blip>
+          <a:srcRect/>
+          <a:stretch>
+            <a:fillRect/>
+          </a:stretch>
+        </p:blipFill>
+        <p:spPr bwMode="auto">
+          <a:xfrm>
+            <a:off x="21886708" y="12083349"/>
+            <a:ext cx="4905322" cy="4997556"/>
+          </a:xfrm>
+          <a:prstGeom prst="rect">
+            <a:avLst/>
+          </a:prstGeom>
+          <a:noFill/>
+          <a:extLst>
+            <a:ext uri="{909E8E84-426E-40DD-AFC4-6F175D3DCCD1}">
+              <a14:hiddenFill xmlns:a14="http://schemas.microsoft.com/office/drawing/2010/main">
+                <a:solidFill>
+                  <a:srgbClr val="FFFFFF"/>
+                </a:solidFill>
+              </a14:hiddenFill>
+            </a:ext>
+          </a:extLst>
+        </p:spPr>
+      </p:pic>
+      <p:pic>
+        <p:nvPicPr>
+          <p:cNvPr id="2058" name="Picture 10" descr="C:\Users\Bulb\Documents\Teknisk Fysik\15hp project\code\data\glass_12_im_100.jpg"/>
+          <p:cNvPicPr>
+            <a:picLocks noChangeAspect="1" noChangeArrowheads="1"/>
+          </p:cNvPicPr>
+          <p:nvPr/>
+        </p:nvPicPr>
+        <p:blipFill>
+          <a:blip r:embed="rId6">
+            <a:extLst>
+              <a:ext uri="{28A0092B-C50C-407E-A947-70E740481C1C}">
+                <a14:useLocalDpi xmlns:a14="http://schemas.microsoft.com/office/drawing/2010/main" val="0"/>
+              </a:ext>
+            </a:extLst>
+          </a:blip>
+          <a:srcRect/>
+          <a:stretch>
+            <a:fillRect/>
+          </a:stretch>
+        </p:blipFill>
+        <p:spPr bwMode="auto">
+          <a:xfrm>
+            <a:off x="27257350" y="17488785"/>
+            <a:ext cx="4968552" cy="4968552"/>
+          </a:xfrm>
+          <a:prstGeom prst="rect">
+            <a:avLst/>
+          </a:prstGeom>
+          <a:noFill/>
+          <a:extLst>
+            <a:ext uri="{909E8E84-426E-40DD-AFC4-6F175D3DCCD1}">
+              <a14:hiddenFill xmlns:a14="http://schemas.microsoft.com/office/drawing/2010/main">
+                <a:solidFill>
+                  <a:srgbClr val="FFFFFF"/>
+                </a:solidFill>
+              </a14:hiddenFill>
+            </a:ext>
+          </a:extLst>
+        </p:spPr>
+      </p:pic>
+      <p:pic>
+        <p:nvPicPr>
+          <p:cNvPr id="2059" name="Picture 11" descr="C:\Users\Bulb\Documents\Teknisk Fysik\15hp project\code\data\glass_12_im_200.jpg"/>
+          <p:cNvPicPr>
+            <a:picLocks noChangeAspect="1" noChangeArrowheads="1"/>
+          </p:cNvPicPr>
+          <p:nvPr/>
+        </p:nvPicPr>
+        <p:blipFill>
+          <a:blip r:embed="rId7">
+            <a:extLst>
+              <a:ext uri="{28A0092B-C50C-407E-A947-70E740481C1C}">
+                <a14:useLocalDpi xmlns:a14="http://schemas.microsoft.com/office/drawing/2010/main" val="0"/>
+              </a:ext>
+            </a:extLst>
+          </a:blip>
+          <a:srcRect/>
+          <a:stretch>
+            <a:fillRect/>
+          </a:stretch>
+        </p:blipFill>
+        <p:spPr bwMode="auto">
+          <a:xfrm>
+            <a:off x="21886708" y="17530401"/>
+            <a:ext cx="4896544" cy="4896544"/>
+          </a:xfrm>
+          <a:prstGeom prst="rect">
+            <a:avLst/>
+          </a:prstGeom>
+          <a:noFill/>
+          <a:extLst>
+            <a:ext uri="{909E8E84-426E-40DD-AFC4-6F175D3DCCD1}">
+              <a14:hiddenFill xmlns:a14="http://schemas.microsoft.com/office/drawing/2010/main">
+                <a:solidFill>
+                  <a:srgbClr val="FFFFFF"/>
+                </a:solidFill>
+              </a14:hiddenFill>
+            </a:ext>
+          </a:extLst>
+        </p:spPr>
+      </p:pic>
+      <p:pic>
+        <p:nvPicPr>
+          <p:cNvPr id="2061" name="Picture 13" descr="C:\Users\Bulb\Documents\Teknisk Fysik\15hp project\code\data\glass_4_im_1.jpg"/>
+          <p:cNvPicPr>
+            <a:picLocks noChangeAspect="1" noChangeArrowheads="1"/>
+          </p:cNvPicPr>
+          <p:nvPr/>
+        </p:nvPicPr>
+        <p:blipFill>
+          <a:blip r:embed="rId8">
+            <a:extLst>
+              <a:ext uri="{28A0092B-C50C-407E-A947-70E740481C1C}">
+                <a14:useLocalDpi xmlns:a14="http://schemas.microsoft.com/office/drawing/2010/main" val="0"/>
+              </a:ext>
+            </a:extLst>
+          </a:blip>
+          <a:srcRect/>
+          <a:stretch>
+            <a:fillRect/>
+          </a:stretch>
+        </p:blipFill>
+        <p:spPr bwMode="auto">
+          <a:xfrm>
+            <a:off x="13647838" y="12083349"/>
+            <a:ext cx="4905322" cy="5021885"/>
+          </a:xfrm>
+          <a:prstGeom prst="rect">
+            <a:avLst/>
+          </a:prstGeom>
+          <a:noFill/>
+          <a:extLst>
+            <a:ext uri="{909E8E84-426E-40DD-AFC4-6F175D3DCCD1}">
+              <a14:hiddenFill xmlns:a14="http://schemas.microsoft.com/office/drawing/2010/main">
+                <a:solidFill>
+                  <a:srgbClr val="FFFFFF"/>
+                </a:solidFill>
+              </a14:hiddenFill>
+            </a:ext>
+          </a:extLst>
+        </p:spPr>
+      </p:pic>
+      <p:sp>
+        <p:nvSpPr>
+          <p:cNvPr id="18" name="TextBox 17"/>
+          <p:cNvSpPr txBox="1"/>
+          <p:nvPr/>
+        </p:nvSpPr>
+        <p:spPr>
+          <a:xfrm>
+            <a:off x="21886708" y="23231810"/>
+            <a:ext cx="9979154" cy="1169551"/>
+          </a:xfrm>
+          <a:prstGeom prst="rect">
+            <a:avLst/>
+          </a:prstGeom>
+          <a:noFill/>
+        </p:spPr>
+        <p:txBody>
+          <a:bodyPr wrap="square" rtlCol="0">
+            <a:spAutoFit/>
+          </a:bodyPr>
+          <a:lstStyle/>
+          <a:p>
+            <a:pPr algn="ctr"/>
+            <a:r>
+              <a:rPr lang="sv-SE" sz="7000" b="1" dirty="0" smtClean="0"/>
+              <a:t>Cancer Cells</a:t>
+            </a:r>
+            <a:endParaRPr lang="en-GB" sz="7000" b="1" dirty="0"/>
+          </a:p>
+        </p:txBody>
+      </p:sp>
+      <p:pic>
+        <p:nvPicPr>
+          <p:cNvPr id="2063" name="Picture 15" descr="C:\Users\Bulb\Documents\Teknisk Fysik\15hp project\code\data\glass_37_im_1.jpg"/>
+          <p:cNvPicPr>
+            <a:picLocks noChangeAspect="1" noChangeArrowheads="1"/>
+          </p:cNvPicPr>
+          <p:nvPr/>
+        </p:nvPicPr>
+        <p:blipFill>
+          <a:blip r:embed="rId9">
+            <a:extLst>
+              <a:ext uri="{28A0092B-C50C-407E-A947-70E740481C1C}">
+                <a14:useLocalDpi xmlns:a14="http://schemas.microsoft.com/office/drawing/2010/main" val="0"/>
+              </a:ext>
+            </a:extLst>
+          </a:blip>
+          <a:srcRect/>
+          <a:stretch>
+            <a:fillRect/>
+          </a:stretch>
+        </p:blipFill>
+        <p:spPr bwMode="auto">
+          <a:xfrm>
+            <a:off x="27228344" y="12083349"/>
+            <a:ext cx="4997557" cy="4997557"/>
+          </a:xfrm>
+          <a:prstGeom prst="rect">
+            <a:avLst/>
+          </a:prstGeom>
+          <a:noFill/>
+          <a:extLst>
+            <a:ext uri="{909E8E84-426E-40DD-AFC4-6F175D3DCCD1}">
+              <a14:hiddenFill xmlns:a14="http://schemas.microsoft.com/office/drawing/2010/main">
+                <a:solidFill>
+                  <a:srgbClr val="FFFFFF"/>
+                </a:solidFill>
+              </a14:hiddenFill>
+            </a:ext>
+          </a:extLst>
+        </p:spPr>
+      </p:pic>
+    </p:spTree>
+    <p:extLst>
+      <p:ext uri="{BB962C8B-B14F-4D97-AF65-F5344CB8AC3E}">
+        <p14:creationId xmlns:p14="http://schemas.microsoft.com/office/powerpoint/2010/main" val="4109800522"/>
+      </p:ext>
+    </p:extLst>
+  </p:cSld>
+  <p:clrMapOvr>
+    <a:masterClrMapping/>
+  </p:clrMapOvr>
+  <p:timing>
+    <p:tnLst>
+      <p:par>
+        <p:cTn id="1" dur="indefinite" restart="never" nodeType="tmRoot"/>
+      </p:par>
+    </p:tnLst>
+  </p:timing>
+</p:sld>
+</file>
+
+<file path=ppt/slides/slide4.xml><?xml version="1.0" encoding="utf-8"?>
 <p:sld xmlns:a="http://schemas.openxmlformats.org/drawingml/2006/main" xmlns:r="http://schemas.openxmlformats.org/officeDocument/2006/relationships" xmlns:p="http://schemas.openxmlformats.org/presentationml/2006/main">
   <p:cSld>
     <p:spTree>
@@ -7171,772 +7604,6 @@
 </p:sld>
 </file>
 
-<file path=ppt/slides/slide4.xml><?xml version="1.0" encoding="utf-8"?>
-<p:sld xmlns:a="http://schemas.openxmlformats.org/drawingml/2006/main" xmlns:r="http://schemas.openxmlformats.org/officeDocument/2006/relationships" xmlns:p="http://schemas.openxmlformats.org/presentationml/2006/main">
-  <p:cSld>
-    <p:spTree>
-      <p:nvGrpSpPr>
-        <p:cNvPr id="1" name=""/>
-        <p:cNvGrpSpPr/>
-        <p:nvPr/>
-      </p:nvGrpSpPr>
-      <p:grpSpPr>
-        <a:xfrm>
-          <a:off x="0" y="0"/>
-          <a:ext cx="0" cy="0"/>
-          <a:chOff x="0" y="0"/>
-          <a:chExt cx="0" cy="0"/>
-        </a:xfrm>
-      </p:grpSpPr>
-      <p:sp>
-        <p:nvSpPr>
-          <p:cNvPr id="2" name="Title 1"/>
-          <p:cNvSpPr>
-            <a:spLocks noGrp="1"/>
-          </p:cNvSpPr>
-          <p:nvPr>
-            <p:ph type="title"/>
-          </p:nvPr>
-        </p:nvSpPr>
-        <p:spPr/>
-        <p:txBody>
-          <a:bodyPr/>
-          <a:lstStyle/>
-          <a:p>
-            <a:r>
-              <a:rPr lang="sv-SE" sz="14400" dirty="0" smtClean="0"/>
-              <a:t>Data</a:t>
-            </a:r>
-            <a:endParaRPr lang="en-GB" sz="14400" dirty="0"/>
-          </a:p>
-        </p:txBody>
-      </p:sp>
-      <p:sp>
-        <p:nvSpPr>
-          <p:cNvPr id="3" name="Content Placeholder 2"/>
-          <p:cNvSpPr>
-            <a:spLocks noGrp="1"/>
-          </p:cNvSpPr>
-          <p:nvPr>
-            <p:ph idx="1"/>
-          </p:nvPr>
-        </p:nvSpPr>
-        <p:spPr>
-          <a:xfrm>
-            <a:off x="7126661" y="4031829"/>
-            <a:ext cx="27779663" cy="17280260"/>
-          </a:xfrm>
-        </p:spPr>
-        <p:txBody>
-          <a:bodyPr/>
-          <a:lstStyle/>
-          <a:p>
-            <a:r>
-              <a:rPr lang="sv-SE" dirty="0" smtClean="0"/>
-              <a:t>10274 80x80 images (75% healthy)</a:t>
-            </a:r>
-          </a:p>
-          <a:p>
-            <a:r>
-              <a:rPr lang="sv-SE" dirty="0" smtClean="0"/>
-              <a:t>Cells sampled from patients mouth</a:t>
-            </a:r>
-          </a:p>
-          <a:p>
-            <a:r>
-              <a:rPr lang="sv-SE" dirty="0" smtClean="0"/>
-              <a:t>Three healthy patients, three with cancer</a:t>
-            </a:r>
-          </a:p>
-          <a:p>
-            <a:r>
-              <a:rPr lang="sv-SE" dirty="0" smtClean="0"/>
-              <a:t>Ground truth on patient level, not cell level</a:t>
-            </a:r>
-            <a:endParaRPr lang="en-GB" dirty="0"/>
-          </a:p>
-        </p:txBody>
-      </p:sp>
-      <p:pic>
-        <p:nvPicPr>
-          <p:cNvPr id="2051" name="Picture 3" descr="C:\Users\Bulb\Documents\Teknisk Fysik\15hp project\code\data\glass_3_im_85.jpg"/>
-          <p:cNvPicPr>
-            <a:picLocks noChangeAspect="1" noChangeArrowheads="1"/>
-          </p:cNvPicPr>
-          <p:nvPr/>
-        </p:nvPicPr>
-        <p:blipFill>
-          <a:blip r:embed="rId2">
-            <a:extLst>
-              <a:ext uri="{28A0092B-C50C-407E-A947-70E740481C1C}">
-                <a14:useLocalDpi xmlns:a14="http://schemas.microsoft.com/office/drawing/2010/main" val="0"/>
-              </a:ext>
-            </a:extLst>
-          </a:blip>
-          <a:srcRect/>
-          <a:stretch>
-            <a:fillRect/>
-          </a:stretch>
-        </p:blipFill>
-        <p:spPr bwMode="auto">
-          <a:xfrm>
-            <a:off x="8198002" y="17597955"/>
-            <a:ext cx="4873771" cy="4908037"/>
-          </a:xfrm>
-          <a:prstGeom prst="rect">
-            <a:avLst/>
-          </a:prstGeom>
-          <a:noFill/>
-          <a:extLst>
-            <a:ext uri="{909E8E84-426E-40DD-AFC4-6F175D3DCCD1}">
-              <a14:hiddenFill xmlns:a14="http://schemas.microsoft.com/office/drawing/2010/main">
-                <a:solidFill>
-                  <a:srgbClr val="FFFFFF"/>
-                </a:solidFill>
-              </a14:hiddenFill>
-            </a:ext>
-          </a:extLst>
-        </p:spPr>
-      </p:pic>
-      <p:pic>
-        <p:nvPicPr>
-          <p:cNvPr id="2052" name="Picture 4" descr="C:\Users\Bulb\Documents\Teknisk Fysik\15hp project\code\data\glass_3_im_200.jpg"/>
-          <p:cNvPicPr>
-            <a:picLocks noChangeAspect="1" noChangeArrowheads="1"/>
-          </p:cNvPicPr>
-          <p:nvPr/>
-        </p:nvPicPr>
-        <p:blipFill>
-          <a:blip r:embed="rId3">
-            <a:extLst>
-              <a:ext uri="{28A0092B-C50C-407E-A947-70E740481C1C}">
-                <a14:useLocalDpi xmlns:a14="http://schemas.microsoft.com/office/drawing/2010/main" val="0"/>
-              </a:ext>
-            </a:extLst>
-          </a:blip>
-          <a:srcRect/>
-          <a:stretch>
-            <a:fillRect/>
-          </a:stretch>
-        </p:blipFill>
-        <p:spPr bwMode="auto">
-          <a:xfrm>
-            <a:off x="13647838" y="17576342"/>
-            <a:ext cx="4873771" cy="4905322"/>
-          </a:xfrm>
-          <a:prstGeom prst="rect">
-            <a:avLst/>
-          </a:prstGeom>
-          <a:noFill/>
-          <a:extLst>
-            <a:ext uri="{909E8E84-426E-40DD-AFC4-6F175D3DCCD1}">
-              <a14:hiddenFill xmlns:a14="http://schemas.microsoft.com/office/drawing/2010/main">
-                <a:solidFill>
-                  <a:srgbClr val="FFFFFF"/>
-                </a:solidFill>
-              </a14:hiddenFill>
-            </a:ext>
-          </a:extLst>
-        </p:spPr>
-      </p:pic>
-      <p:pic>
-        <p:nvPicPr>
-          <p:cNvPr id="2053" name="Picture 5" descr="C:\Users\Bulb\Documents\Teknisk Fysik\15hp project\code\data\glass_3_im_1000.jpg"/>
-          <p:cNvPicPr>
-            <a:picLocks noChangeAspect="1" noChangeArrowheads="1"/>
-          </p:cNvPicPr>
-          <p:nvPr/>
-        </p:nvPicPr>
-        <p:blipFill>
-          <a:blip r:embed="rId4">
-            <a:extLst>
-              <a:ext uri="{28A0092B-C50C-407E-A947-70E740481C1C}">
-                <a14:useLocalDpi xmlns:a14="http://schemas.microsoft.com/office/drawing/2010/main" val="0"/>
-              </a:ext>
-            </a:extLst>
-          </a:blip>
-          <a:srcRect/>
-          <a:stretch>
-            <a:fillRect/>
-          </a:stretch>
-        </p:blipFill>
-        <p:spPr bwMode="auto">
-          <a:xfrm>
-            <a:off x="8141429" y="12083349"/>
-            <a:ext cx="4905322" cy="5021884"/>
-          </a:xfrm>
-          <a:prstGeom prst="rect">
-            <a:avLst/>
-          </a:prstGeom>
-          <a:noFill/>
-          <a:extLst>
-            <a:ext uri="{909E8E84-426E-40DD-AFC4-6F175D3DCCD1}">
-              <a14:hiddenFill xmlns:a14="http://schemas.microsoft.com/office/drawing/2010/main">
-                <a:solidFill>
-                  <a:srgbClr val="FFFFFF"/>
-                </a:solidFill>
-              </a14:hiddenFill>
-            </a:ext>
-          </a:extLst>
-        </p:spPr>
-      </p:pic>
-      <p:sp>
-        <p:nvSpPr>
-          <p:cNvPr id="4" name="TextBox 3"/>
-          <p:cNvSpPr txBox="1"/>
-          <p:nvPr/>
-        </p:nvSpPr>
-        <p:spPr>
-          <a:xfrm>
-            <a:off x="8141429" y="23256138"/>
-            <a:ext cx="10411732" cy="1169551"/>
-          </a:xfrm>
-          <a:prstGeom prst="rect">
-            <a:avLst/>
-          </a:prstGeom>
-          <a:noFill/>
-        </p:spPr>
-        <p:txBody>
-          <a:bodyPr wrap="square" rtlCol="0">
-            <a:spAutoFit/>
-          </a:bodyPr>
-          <a:lstStyle/>
-          <a:p>
-            <a:pPr algn="ctr"/>
-            <a:r>
-              <a:rPr lang="sv-SE" sz="7000" b="1" dirty="0" smtClean="0"/>
-              <a:t>Healthy Cells</a:t>
-            </a:r>
-            <a:endParaRPr lang="en-GB" sz="7000" b="1" dirty="0"/>
-          </a:p>
-        </p:txBody>
-      </p:sp>
-      <p:pic>
-        <p:nvPicPr>
-          <p:cNvPr id="2057" name="Picture 9" descr="C:\Users\Bulb\Documents\Teknisk Fysik\15hp project\code\data\glass_12_im_50.jpg"/>
-          <p:cNvPicPr>
-            <a:picLocks noChangeAspect="1" noChangeArrowheads="1"/>
-          </p:cNvPicPr>
-          <p:nvPr/>
-        </p:nvPicPr>
-        <p:blipFill>
-          <a:blip r:embed="rId5">
-            <a:extLst>
-              <a:ext uri="{28A0092B-C50C-407E-A947-70E740481C1C}">
-                <a14:useLocalDpi xmlns:a14="http://schemas.microsoft.com/office/drawing/2010/main" val="0"/>
-              </a:ext>
-            </a:extLst>
-          </a:blip>
-          <a:srcRect/>
-          <a:stretch>
-            <a:fillRect/>
-          </a:stretch>
-        </p:blipFill>
-        <p:spPr bwMode="auto">
-          <a:xfrm>
-            <a:off x="21886708" y="12083349"/>
-            <a:ext cx="4905322" cy="4997556"/>
-          </a:xfrm>
-          <a:prstGeom prst="rect">
-            <a:avLst/>
-          </a:prstGeom>
-          <a:noFill/>
-          <a:extLst>
-            <a:ext uri="{909E8E84-426E-40DD-AFC4-6F175D3DCCD1}">
-              <a14:hiddenFill xmlns:a14="http://schemas.microsoft.com/office/drawing/2010/main">
-                <a:solidFill>
-                  <a:srgbClr val="FFFFFF"/>
-                </a:solidFill>
-              </a14:hiddenFill>
-            </a:ext>
-          </a:extLst>
-        </p:spPr>
-      </p:pic>
-      <p:pic>
-        <p:nvPicPr>
-          <p:cNvPr id="2058" name="Picture 10" descr="C:\Users\Bulb\Documents\Teknisk Fysik\15hp project\code\data\glass_12_im_100.jpg"/>
-          <p:cNvPicPr>
-            <a:picLocks noChangeAspect="1" noChangeArrowheads="1"/>
-          </p:cNvPicPr>
-          <p:nvPr/>
-        </p:nvPicPr>
-        <p:blipFill>
-          <a:blip r:embed="rId6">
-            <a:extLst>
-              <a:ext uri="{28A0092B-C50C-407E-A947-70E740481C1C}">
-                <a14:useLocalDpi xmlns:a14="http://schemas.microsoft.com/office/drawing/2010/main" val="0"/>
-              </a:ext>
-            </a:extLst>
-          </a:blip>
-          <a:srcRect/>
-          <a:stretch>
-            <a:fillRect/>
-          </a:stretch>
-        </p:blipFill>
-        <p:spPr bwMode="auto">
-          <a:xfrm>
-            <a:off x="27257350" y="17488785"/>
-            <a:ext cx="4968552" cy="4968552"/>
-          </a:xfrm>
-          <a:prstGeom prst="rect">
-            <a:avLst/>
-          </a:prstGeom>
-          <a:noFill/>
-          <a:extLst>
-            <a:ext uri="{909E8E84-426E-40DD-AFC4-6F175D3DCCD1}">
-              <a14:hiddenFill xmlns:a14="http://schemas.microsoft.com/office/drawing/2010/main">
-                <a:solidFill>
-                  <a:srgbClr val="FFFFFF"/>
-                </a:solidFill>
-              </a14:hiddenFill>
-            </a:ext>
-          </a:extLst>
-        </p:spPr>
-      </p:pic>
-      <p:pic>
-        <p:nvPicPr>
-          <p:cNvPr id="2059" name="Picture 11" descr="C:\Users\Bulb\Documents\Teknisk Fysik\15hp project\code\data\glass_12_im_200.jpg"/>
-          <p:cNvPicPr>
-            <a:picLocks noChangeAspect="1" noChangeArrowheads="1"/>
-          </p:cNvPicPr>
-          <p:nvPr/>
-        </p:nvPicPr>
-        <p:blipFill>
-          <a:blip r:embed="rId7">
-            <a:extLst>
-              <a:ext uri="{28A0092B-C50C-407E-A947-70E740481C1C}">
-                <a14:useLocalDpi xmlns:a14="http://schemas.microsoft.com/office/drawing/2010/main" val="0"/>
-              </a:ext>
-            </a:extLst>
-          </a:blip>
-          <a:srcRect/>
-          <a:stretch>
-            <a:fillRect/>
-          </a:stretch>
-        </p:blipFill>
-        <p:spPr bwMode="auto">
-          <a:xfrm>
-            <a:off x="21886708" y="17530401"/>
-            <a:ext cx="4896544" cy="4896544"/>
-          </a:xfrm>
-          <a:prstGeom prst="rect">
-            <a:avLst/>
-          </a:prstGeom>
-          <a:noFill/>
-          <a:extLst>
-            <a:ext uri="{909E8E84-426E-40DD-AFC4-6F175D3DCCD1}">
-              <a14:hiddenFill xmlns:a14="http://schemas.microsoft.com/office/drawing/2010/main">
-                <a:solidFill>
-                  <a:srgbClr val="FFFFFF"/>
-                </a:solidFill>
-              </a14:hiddenFill>
-            </a:ext>
-          </a:extLst>
-        </p:spPr>
-      </p:pic>
-      <p:pic>
-        <p:nvPicPr>
-          <p:cNvPr id="2061" name="Picture 13" descr="C:\Users\Bulb\Documents\Teknisk Fysik\15hp project\code\data\glass_4_im_1.jpg"/>
-          <p:cNvPicPr>
-            <a:picLocks noChangeAspect="1" noChangeArrowheads="1"/>
-          </p:cNvPicPr>
-          <p:nvPr/>
-        </p:nvPicPr>
-        <p:blipFill>
-          <a:blip r:embed="rId8">
-            <a:extLst>
-              <a:ext uri="{28A0092B-C50C-407E-A947-70E740481C1C}">
-                <a14:useLocalDpi xmlns:a14="http://schemas.microsoft.com/office/drawing/2010/main" val="0"/>
-              </a:ext>
-            </a:extLst>
-          </a:blip>
-          <a:srcRect/>
-          <a:stretch>
-            <a:fillRect/>
-          </a:stretch>
-        </p:blipFill>
-        <p:spPr bwMode="auto">
-          <a:xfrm>
-            <a:off x="13647838" y="12083349"/>
-            <a:ext cx="4905322" cy="5021885"/>
-          </a:xfrm>
-          <a:prstGeom prst="rect">
-            <a:avLst/>
-          </a:prstGeom>
-          <a:noFill/>
-          <a:extLst>
-            <a:ext uri="{909E8E84-426E-40DD-AFC4-6F175D3DCCD1}">
-              <a14:hiddenFill xmlns:a14="http://schemas.microsoft.com/office/drawing/2010/main">
-                <a:solidFill>
-                  <a:srgbClr val="FFFFFF"/>
-                </a:solidFill>
-              </a14:hiddenFill>
-            </a:ext>
-          </a:extLst>
-        </p:spPr>
-      </p:pic>
-      <p:sp>
-        <p:nvSpPr>
-          <p:cNvPr id="18" name="TextBox 17"/>
-          <p:cNvSpPr txBox="1"/>
-          <p:nvPr/>
-        </p:nvSpPr>
-        <p:spPr>
-          <a:xfrm>
-            <a:off x="21886708" y="23231810"/>
-            <a:ext cx="9979154" cy="1169551"/>
-          </a:xfrm>
-          <a:prstGeom prst="rect">
-            <a:avLst/>
-          </a:prstGeom>
-          <a:noFill/>
-        </p:spPr>
-        <p:txBody>
-          <a:bodyPr wrap="square" rtlCol="0">
-            <a:spAutoFit/>
-          </a:bodyPr>
-          <a:lstStyle/>
-          <a:p>
-            <a:pPr algn="ctr"/>
-            <a:r>
-              <a:rPr lang="sv-SE" sz="7000" b="1" dirty="0" smtClean="0"/>
-              <a:t>Cancer Cells</a:t>
-            </a:r>
-            <a:endParaRPr lang="en-GB" sz="7000" b="1" dirty="0"/>
-          </a:p>
-        </p:txBody>
-      </p:sp>
-      <p:pic>
-        <p:nvPicPr>
-          <p:cNvPr id="2063" name="Picture 15" descr="C:\Users\Bulb\Documents\Teknisk Fysik\15hp project\code\data\glass_37_im_1.jpg"/>
-          <p:cNvPicPr>
-            <a:picLocks noChangeAspect="1" noChangeArrowheads="1"/>
-          </p:cNvPicPr>
-          <p:nvPr/>
-        </p:nvPicPr>
-        <p:blipFill>
-          <a:blip r:embed="rId9">
-            <a:extLst>
-              <a:ext uri="{28A0092B-C50C-407E-A947-70E740481C1C}">
-                <a14:useLocalDpi xmlns:a14="http://schemas.microsoft.com/office/drawing/2010/main" val="0"/>
-              </a:ext>
-            </a:extLst>
-          </a:blip>
-          <a:srcRect/>
-          <a:stretch>
-            <a:fillRect/>
-          </a:stretch>
-        </p:blipFill>
-        <p:spPr bwMode="auto">
-          <a:xfrm>
-            <a:off x="27228344" y="12083349"/>
-            <a:ext cx="4997557" cy="4997557"/>
-          </a:xfrm>
-          <a:prstGeom prst="rect">
-            <a:avLst/>
-          </a:prstGeom>
-          <a:noFill/>
-          <a:extLst>
-            <a:ext uri="{909E8E84-426E-40DD-AFC4-6F175D3DCCD1}">
-              <a14:hiddenFill xmlns:a14="http://schemas.microsoft.com/office/drawing/2010/main">
-                <a:solidFill>
-                  <a:srgbClr val="FFFFFF"/>
-                </a:solidFill>
-              </a14:hiddenFill>
-            </a:ext>
-          </a:extLst>
-        </p:spPr>
-      </p:pic>
-    </p:spTree>
-    <p:extLst>
-      <p:ext uri="{BB962C8B-B14F-4D97-AF65-F5344CB8AC3E}">
-        <p14:creationId xmlns:p14="http://schemas.microsoft.com/office/powerpoint/2010/main" val="4109800522"/>
-      </p:ext>
-    </p:extLst>
-  </p:cSld>
-  <p:clrMapOvr>
-    <a:masterClrMapping/>
-  </p:clrMapOvr>
-  <p:timing>
-    <p:tnLst>
-      <p:par>
-        <p:cTn id="1" dur="indefinite" restart="never" nodeType="tmRoot">
-          <p:childTnLst>
-            <p:seq concurrent="1" nextAc="seek">
-              <p:cTn id="2" dur="indefinite" nodeType="mainSeq">
-                <p:childTnLst>
-                  <p:par>
-                    <p:cTn id="3" fill="hold">
-                      <p:stCondLst>
-                        <p:cond delay="indefinite"/>
-                      </p:stCondLst>
-                      <p:childTnLst>
-                        <p:par>
-                          <p:cTn id="4" fill="hold">
-                            <p:stCondLst>
-                              <p:cond delay="0"/>
-                            </p:stCondLst>
-                            <p:childTnLst>
-                              <p:par>
-                                <p:cTn id="5" presetID="10" presetClass="entr" presetSubtype="0" fill="hold" grpId="0" nodeType="clickEffect">
-                                  <p:stCondLst>
-                                    <p:cond delay="0"/>
-                                  </p:stCondLst>
-                                  <p:childTnLst>
-                                    <p:set>
-                                      <p:cBhvr>
-                                        <p:cTn id="6" dur="1" fill="hold">
-                                          <p:stCondLst>
-                                            <p:cond delay="0"/>
-                                          </p:stCondLst>
-                                        </p:cTn>
-                                        <p:tgtEl>
-                                          <p:spTgt spid="3">
-                                            <p:txEl>
-                                              <p:pRg st="0" end="0"/>
-                                            </p:txEl>
-                                          </p:spTgt>
-                                        </p:tgtEl>
-                                        <p:attrNameLst>
-                                          <p:attrName>style.visibility</p:attrName>
-                                        </p:attrNameLst>
-                                      </p:cBhvr>
-                                      <p:to>
-                                        <p:strVal val="visible"/>
-                                      </p:to>
-                                    </p:set>
-                                    <p:animEffect transition="in" filter="fade">
-                                      <p:cBhvr>
-                                        <p:cTn id="7" dur="500"/>
-                                        <p:tgtEl>
-                                          <p:spTgt spid="3">
-                                            <p:txEl>
-                                              <p:pRg st="0" end="0"/>
-                                            </p:txEl>
-                                          </p:spTgt>
-                                        </p:tgtEl>
-                                      </p:cBhvr>
-                                    </p:animEffect>
-                                  </p:childTnLst>
-                                </p:cTn>
-                              </p:par>
-                            </p:childTnLst>
-                          </p:cTn>
-                        </p:par>
-                      </p:childTnLst>
-                    </p:cTn>
-                  </p:par>
-                  <p:par>
-                    <p:cTn id="8" fill="hold">
-                      <p:stCondLst>
-                        <p:cond delay="indefinite"/>
-                      </p:stCondLst>
-                      <p:childTnLst>
-                        <p:par>
-                          <p:cTn id="9" fill="hold">
-                            <p:stCondLst>
-                              <p:cond delay="0"/>
-                            </p:stCondLst>
-                            <p:childTnLst>
-                              <p:par>
-                                <p:cTn id="10" presetID="10" presetClass="entr" presetSubtype="0" fill="hold" grpId="0" nodeType="clickEffect">
-                                  <p:stCondLst>
-                                    <p:cond delay="0"/>
-                                  </p:stCondLst>
-                                  <p:childTnLst>
-                                    <p:set>
-                                      <p:cBhvr>
-                                        <p:cTn id="11" dur="1" fill="hold">
-                                          <p:stCondLst>
-                                            <p:cond delay="0"/>
-                                          </p:stCondLst>
-                                        </p:cTn>
-                                        <p:tgtEl>
-                                          <p:spTgt spid="3">
-                                            <p:txEl>
-                                              <p:pRg st="1" end="1"/>
-                                            </p:txEl>
-                                          </p:spTgt>
-                                        </p:tgtEl>
-                                        <p:attrNameLst>
-                                          <p:attrName>style.visibility</p:attrName>
-                                        </p:attrNameLst>
-                                      </p:cBhvr>
-                                      <p:to>
-                                        <p:strVal val="visible"/>
-                                      </p:to>
-                                    </p:set>
-                                    <p:animEffect transition="in" filter="fade">
-                                      <p:cBhvr>
-                                        <p:cTn id="12" dur="500"/>
-                                        <p:tgtEl>
-                                          <p:spTgt spid="3">
-                                            <p:txEl>
-                                              <p:pRg st="1" end="1"/>
-                                            </p:txEl>
-                                          </p:spTgt>
-                                        </p:tgtEl>
-                                      </p:cBhvr>
-                                    </p:animEffect>
-                                  </p:childTnLst>
-                                </p:cTn>
-                              </p:par>
-                            </p:childTnLst>
-                          </p:cTn>
-                        </p:par>
-                      </p:childTnLst>
-                    </p:cTn>
-                  </p:par>
-                  <p:par>
-                    <p:cTn id="13" fill="hold">
-                      <p:stCondLst>
-                        <p:cond delay="indefinite"/>
-                      </p:stCondLst>
-                      <p:childTnLst>
-                        <p:par>
-                          <p:cTn id="14" fill="hold">
-                            <p:stCondLst>
-                              <p:cond delay="0"/>
-                            </p:stCondLst>
-                            <p:childTnLst>
-                              <p:par>
-                                <p:cTn id="15" presetID="10" presetClass="entr" presetSubtype="0" fill="hold" grpId="0" nodeType="clickEffect">
-                                  <p:stCondLst>
-                                    <p:cond delay="0"/>
-                                  </p:stCondLst>
-                                  <p:childTnLst>
-                                    <p:set>
-                                      <p:cBhvr>
-                                        <p:cTn id="16" dur="1" fill="hold">
-                                          <p:stCondLst>
-                                            <p:cond delay="0"/>
-                                          </p:stCondLst>
-                                        </p:cTn>
-                                        <p:tgtEl>
-                                          <p:spTgt spid="3">
-                                            <p:txEl>
-                                              <p:pRg st="2" end="2"/>
-                                            </p:txEl>
-                                          </p:spTgt>
-                                        </p:tgtEl>
-                                        <p:attrNameLst>
-                                          <p:attrName>style.visibility</p:attrName>
-                                        </p:attrNameLst>
-                                      </p:cBhvr>
-                                      <p:to>
-                                        <p:strVal val="visible"/>
-                                      </p:to>
-                                    </p:set>
-                                    <p:animEffect transition="in" filter="fade">
-                                      <p:cBhvr>
-                                        <p:cTn id="17" dur="500"/>
-                                        <p:tgtEl>
-                                          <p:spTgt spid="3">
-                                            <p:txEl>
-                                              <p:pRg st="2" end="2"/>
-                                            </p:txEl>
-                                          </p:spTgt>
-                                        </p:tgtEl>
-                                      </p:cBhvr>
-                                    </p:animEffect>
-                                  </p:childTnLst>
-                                </p:cTn>
-                              </p:par>
-                            </p:childTnLst>
-                          </p:cTn>
-                        </p:par>
-                      </p:childTnLst>
-                    </p:cTn>
-                  </p:par>
-                  <p:par>
-                    <p:cTn id="18" fill="hold">
-                      <p:stCondLst>
-                        <p:cond delay="indefinite"/>
-                      </p:stCondLst>
-                      <p:childTnLst>
-                        <p:par>
-                          <p:cTn id="19" fill="hold">
-                            <p:stCondLst>
-                              <p:cond delay="0"/>
-                            </p:stCondLst>
-                            <p:childTnLst>
-                              <p:par>
-                                <p:cTn id="20" presetID="10" presetClass="entr" presetSubtype="0" fill="hold" grpId="0" nodeType="clickEffect">
-                                  <p:stCondLst>
-                                    <p:cond delay="0"/>
-                                  </p:stCondLst>
-                                  <p:childTnLst>
-                                    <p:set>
-                                      <p:cBhvr>
-                                        <p:cTn id="21" dur="1" fill="hold">
-                                          <p:stCondLst>
-                                            <p:cond delay="0"/>
-                                          </p:stCondLst>
-                                        </p:cTn>
-                                        <p:tgtEl>
-                                          <p:spTgt spid="3">
-                                            <p:txEl>
-                                              <p:pRg st="3" end="3"/>
-                                            </p:txEl>
-                                          </p:spTgt>
-                                        </p:tgtEl>
-                                        <p:attrNameLst>
-                                          <p:attrName>style.visibility</p:attrName>
-                                        </p:attrNameLst>
-                                      </p:cBhvr>
-                                      <p:to>
-                                        <p:strVal val="visible"/>
-                                      </p:to>
-                                    </p:set>
-                                    <p:animEffect transition="in" filter="fade">
-                                      <p:cBhvr>
-                                        <p:cTn id="22" dur="500"/>
-                                        <p:tgtEl>
-                                          <p:spTgt spid="3">
-                                            <p:txEl>
-                                              <p:pRg st="3" end="3"/>
-                                            </p:txEl>
-                                          </p:spTgt>
-                                        </p:tgtEl>
-                                      </p:cBhvr>
-                                    </p:animEffect>
-                                  </p:childTnLst>
-                                </p:cTn>
-                              </p:par>
-                            </p:childTnLst>
-                          </p:cTn>
-                        </p:par>
-                      </p:childTnLst>
-                    </p:cTn>
-                  </p:par>
-                </p:childTnLst>
-              </p:cTn>
-              <p:prevCondLst>
-                <p:cond evt="onPrev" delay="0">
-                  <p:tgtEl>
-                    <p:sldTgt/>
-                  </p:tgtEl>
-                </p:cond>
-              </p:prevCondLst>
-              <p:nextCondLst>
-                <p:cond evt="onNext" delay="0">
-                  <p:tgtEl>
-                    <p:sldTgt/>
-                  </p:tgtEl>
-                </p:cond>
-              </p:nextCondLst>
-            </p:seq>
-          </p:childTnLst>
-        </p:cTn>
-      </p:par>
-    </p:tnLst>
-    <p:bldLst>
-      <p:bldP spid="3" grpId="0" build="p"/>
-    </p:bldLst>
-  </p:timing>
-</p:sld>
-</file>
-
 <file path=ppt/slides/slide5.xml><?xml version="1.0" encoding="utf-8"?>
 <p:sld xmlns:a="http://schemas.openxmlformats.org/drawingml/2006/main" xmlns:r="http://schemas.openxmlformats.org/officeDocument/2006/relationships" xmlns:p="http://schemas.openxmlformats.org/presentationml/2006/main">
   <p:cSld>
@@ -7977,8 +7644,8 @@
           </a:p>
         </p:txBody>
       </p:sp>
-      <mc:AlternateContent xmlns:mc="http://schemas.openxmlformats.org/markup-compatibility/2006" xmlns:a14="http://schemas.microsoft.com/office/drawing/2010/main">
-        <mc:Choice Requires="a14">
+      <mc:AlternateContent xmlns:mc="http://schemas.openxmlformats.org/markup-compatibility/2006">
+        <mc:Choice xmlns:a14="http://schemas.microsoft.com/office/drawing/2010/main" Requires="a14">
           <p:sp>
             <p:nvSpPr>
               <p:cNvPr id="3" name="Content Placeholder 2"/>
@@ -8021,14 +7688,11 @@
                 <a:pPr lvl="1"/>
                 <a:r>
                   <a:rPr lang="sv-SE" sz="8000" dirty="0" smtClean="0"/>
-                  <a:t>Sigmoid activation to smooth noise</a:t>
+                  <a:t>Multiply </a:t>
                 </a:r>
-              </a:p>
-              <a:p>
-                <a:pPr lvl="1"/>
                 <a:r>
                   <a:rPr lang="sv-SE" sz="8000" dirty="0" smtClean="0"/>
-                  <a:t>Multiply each output by learnable constant </a:t>
+                  <a:t>each output by learnable constant </a:t>
                 </a:r>
                 <a14:m>
                   <m:oMath xmlns:m="http://schemas.openxmlformats.org/officeDocument/2006/math">
@@ -8075,7 +7739,7 @@
             </p:txBody>
           </p:sp>
         </mc:Choice>
-        <mc:Fallback xmlns="">
+        <mc:Fallback>
           <p:sp>
             <p:nvSpPr>
               <p:cNvPr id="3" name="Content Placeholder 2"/>
@@ -8122,13 +7786,13 @@
           <p:nvPr>
             <p:extLst>
               <p:ext uri="{D42A27DB-BD31-4B8C-83A1-F6EECF244321}">
-                <p14:modId xmlns:p14="http://schemas.microsoft.com/office/powerpoint/2010/main" val="708541717"/>
+                <p14:modId xmlns:p14="http://schemas.microsoft.com/office/powerpoint/2010/main" val="2488972079"/>
               </p:ext>
             </p:extLst>
           </p:nvPr>
         </p:nvGraphicFramePr>
         <p:xfrm>
-          <a:off x="6478590" y="14256966"/>
+          <a:off x="6478590" y="12744797"/>
           <a:ext cx="3672408" cy="3456384"/>
         </p:xfrm>
         <a:graphic>
@@ -8296,13 +7960,13 @@
           <p:nvPr>
             <p:extLst>
               <p:ext uri="{D42A27DB-BD31-4B8C-83A1-F6EECF244321}">
-                <p14:modId xmlns:p14="http://schemas.microsoft.com/office/powerpoint/2010/main" val="738636015"/>
+                <p14:modId xmlns:p14="http://schemas.microsoft.com/office/powerpoint/2010/main" val="4014302931"/>
               </p:ext>
             </p:extLst>
           </p:nvPr>
         </p:nvGraphicFramePr>
         <p:xfrm>
-          <a:off x="6478589" y="18217404"/>
+          <a:off x="6478589" y="16705235"/>
           <a:ext cx="3672408" cy="3528393"/>
         </p:xfrm>
         <a:graphic>
@@ -8470,13 +8134,13 @@
           <p:nvPr>
             <p:extLst>
               <p:ext uri="{D42A27DB-BD31-4B8C-83A1-F6EECF244321}">
-                <p14:modId xmlns:p14="http://schemas.microsoft.com/office/powerpoint/2010/main" val="814342614"/>
+                <p14:modId xmlns:p14="http://schemas.microsoft.com/office/powerpoint/2010/main" val="1169374382"/>
               </p:ext>
             </p:extLst>
           </p:nvPr>
         </p:nvGraphicFramePr>
         <p:xfrm>
-          <a:off x="10799069" y="15116958"/>
+          <a:off x="10799069" y="13604789"/>
           <a:ext cx="3672408" cy="3460487"/>
         </p:xfrm>
         <a:graphic>
@@ -8635,8 +8299,8 @@
           </a:graphicData>
         </a:graphic>
       </p:graphicFrame>
-      <mc:AlternateContent xmlns:mc="http://schemas.openxmlformats.org/markup-compatibility/2006" xmlns:a14="http://schemas.microsoft.com/office/drawing/2010/main">
-        <mc:Choice Requires="a14">
+      <mc:AlternateContent xmlns:mc="http://schemas.openxmlformats.org/markup-compatibility/2006">
+        <mc:Choice xmlns:a14="http://schemas.microsoft.com/office/drawing/2010/main" Requires="a14">
           <p:sp>
             <p:nvSpPr>
               <p:cNvPr id="4" name="TextBox 3"/>
@@ -8645,7 +8309,7 @@
             </p:nvSpPr>
             <p:spPr>
               <a:xfrm>
-                <a:off x="18215893" y="15843503"/>
+                <a:off x="18215893" y="14331334"/>
                 <a:ext cx="3024336" cy="3551678"/>
               </a:xfrm>
               <a:prstGeom prst="rect">
@@ -8788,7 +8452,7 @@
             </p:txBody>
           </p:sp>
         </mc:Choice>
-        <mc:Fallback xmlns="">
+        <mc:Fallback>
           <p:sp>
             <p:nvSpPr>
               <p:cNvPr id="4" name="TextBox 3"/>
@@ -8799,7 +8463,7 @@
             </p:nvSpPr>
             <p:spPr>
               <a:xfrm>
-                <a:off x="18215893" y="15843503"/>
+                <a:off x="18215893" y="14331334"/>
                 <a:ext cx="3024336" cy="3551678"/>
               </a:xfrm>
               <a:prstGeom prst="rect">
@@ -8835,7 +8499,7 @@
         </p:nvSpPr>
         <p:spPr bwMode="auto">
           <a:xfrm>
-            <a:off x="15551597" y="16913789"/>
+            <a:off x="15551597" y="15401620"/>
             <a:ext cx="1584176" cy="1303616"/>
           </a:xfrm>
           <a:prstGeom prst="rightArrow">
@@ -8901,8 +8565,8 @@
           </a:p>
         </p:txBody>
       </p:sp>
-      <mc:AlternateContent xmlns:mc="http://schemas.openxmlformats.org/markup-compatibility/2006" xmlns:a14="http://schemas.microsoft.com/office/drawing/2010/main">
-        <mc:Choice Requires="a14">
+      <mc:AlternateContent xmlns:mc="http://schemas.openxmlformats.org/markup-compatibility/2006">
+        <mc:Choice xmlns:a14="http://schemas.microsoft.com/office/drawing/2010/main" Requires="a14">
           <p:sp>
             <p:nvSpPr>
               <p:cNvPr id="6" name="TextBox 5"/>
@@ -8911,7 +8575,7 @@
             </p:nvSpPr>
             <p:spPr>
               <a:xfrm>
-                <a:off x="11807181" y="19475474"/>
+                <a:off x="11807181" y="17963305"/>
                 <a:ext cx="1135247" cy="1200329"/>
               </a:xfrm>
               <a:prstGeom prst="rect">
@@ -8946,7 +8610,7 @@
             </p:txBody>
           </p:sp>
         </mc:Choice>
-        <mc:Fallback xmlns="">
+        <mc:Fallback>
           <p:sp>
             <p:nvSpPr>
               <p:cNvPr id="6" name="TextBox 5"/>
@@ -8957,7 +8621,7 @@
             </p:nvSpPr>
             <p:spPr>
               <a:xfrm>
-                <a:off x="11807181" y="19475474"/>
+                <a:off x="11807181" y="17963305"/>
                 <a:ext cx="1135247" cy="1200329"/>
               </a:xfrm>
               <a:prstGeom prst="rect">
@@ -8993,7 +8657,7 @@
         </p:nvSpPr>
         <p:spPr bwMode="auto">
           <a:xfrm rot="21600000">
-            <a:off x="25056653" y="16985797"/>
+            <a:off x="25056653" y="15473628"/>
             <a:ext cx="1584176" cy="1303616"/>
           </a:xfrm>
           <a:prstGeom prst="rightArrow">
@@ -9068,13 +8732,13 @@
           <p:nvPr>
             <p:extLst>
               <p:ext uri="{D42A27DB-BD31-4B8C-83A1-F6EECF244321}">
-                <p14:modId xmlns:p14="http://schemas.microsoft.com/office/powerpoint/2010/main" val="2423670753"/>
+                <p14:modId xmlns:p14="http://schemas.microsoft.com/office/powerpoint/2010/main" val="961783206"/>
               </p:ext>
             </p:extLst>
           </p:nvPr>
         </p:nvGraphicFramePr>
         <p:xfrm>
-          <a:off x="28369021" y="15855841"/>
+          <a:off x="28369021" y="14343672"/>
           <a:ext cx="4896540" cy="3960440"/>
         </p:xfrm>
         <a:graphic>
@@ -10219,8 +9883,8 @@
           </a:graphicData>
         </a:graphic>
       </p:graphicFrame>
-      <mc:AlternateContent xmlns:mc="http://schemas.openxmlformats.org/markup-compatibility/2006" xmlns:a14="http://schemas.microsoft.com/office/drawing/2010/main">
-        <mc:Choice Requires="a14">
+      <mc:AlternateContent xmlns:mc="http://schemas.openxmlformats.org/markup-compatibility/2006">
+        <mc:Choice xmlns:a14="http://schemas.microsoft.com/office/drawing/2010/main" Requires="a14">
           <p:sp>
             <p:nvSpPr>
               <p:cNvPr id="7" name="TextBox 6"/>
@@ -10229,8 +9893,8 @@
             </p:nvSpPr>
             <p:spPr>
               <a:xfrm>
-                <a:off x="5653623" y="22129703"/>
-                <a:ext cx="9393918" cy="2123658"/>
+                <a:off x="6014299" y="21262476"/>
+                <a:ext cx="8672566" cy="3323987"/>
               </a:xfrm>
               <a:prstGeom prst="rect">
                 <a:avLst/>
@@ -10245,32 +9909,45 @@
               <a:p>
                 <a:pPr algn="ctr"/>
                 <a:r>
-                  <a:rPr lang="sv-SE" sz="4800" dirty="0" smtClean="0"/>
+                  <a:rPr lang="sv-SE" sz="5400" dirty="0" smtClean="0"/>
                   <a:t>Apply </a:t>
                 </a:r>
                 <a:r>
-                  <a:rPr lang="sv-SE" sz="6000" dirty="0"/>
+                  <a:rPr lang="sv-SE" sz="6600" dirty="0"/>
                   <a:t>𝑛</a:t>
                 </a:r>
                 <a:r>
-                  <a:rPr lang="sv-SE" sz="4800" dirty="0"/>
+                  <a:rPr lang="sv-SE" sz="5400" dirty="0"/>
                   <a:t> </a:t>
                 </a:r>
                 <a:r>
-                  <a:rPr lang="sv-SE" sz="4800" dirty="0" smtClean="0"/>
-                  <a:t>fixed convolutional filters </a:t>
+                  <a:rPr lang="sv-SE" sz="5400" dirty="0" smtClean="0"/>
+                  <a:t>fixed convolutional </a:t>
                 </a:r>
+                <a:endParaRPr lang="sv-SE" sz="5400" dirty="0" smtClean="0"/>
               </a:p>
               <a:p>
                 <a:pPr algn="ctr"/>
                 <a:r>
-                  <a:rPr lang="sv-SE" sz="4800" dirty="0" smtClean="0"/>
-                  <a:t>to image, giving outputs </a:t>
+                  <a:rPr lang="sv-SE" sz="5400" dirty="0" smtClean="0"/>
+                  <a:t>filters to </a:t>
+                </a:r>
+                <a:r>
+                  <a:rPr lang="sv-SE" sz="5400" dirty="0" smtClean="0"/>
+                  <a:t>image, giving </a:t>
+                </a:r>
+                <a:endParaRPr lang="sv-SE" sz="5400" dirty="0" smtClean="0"/>
+              </a:p>
+              <a:p>
+                <a:pPr algn="ctr"/>
+                <a:r>
+                  <a:rPr lang="sv-SE" sz="5400" dirty="0" smtClean="0"/>
+                  <a:t>outputs </a:t>
                 </a:r>
                 <a14:m>
                   <m:oMath xmlns:m="http://schemas.openxmlformats.org/officeDocument/2006/math">
                     <m:r>
-                      <a:rPr lang="en-GB" sz="6000" i="1">
+                      <a:rPr lang="en-GB" sz="6600" i="1">
                         <a:latin typeface="Cambria Math"/>
                         <a:ea typeface="Cambria Math"/>
                       </a:rPr>
@@ -10278,12 +9955,12 @@
                     </m:r>
                   </m:oMath>
                 </a14:m>
-                <a:endParaRPr lang="sv-SE" sz="4800" dirty="0"/>
+                <a:endParaRPr lang="sv-SE" sz="5400" dirty="0"/>
               </a:p>
             </p:txBody>
           </p:sp>
         </mc:Choice>
-        <mc:Fallback xmlns="">
+        <mc:Fallback>
           <p:sp>
             <p:nvSpPr>
               <p:cNvPr id="7" name="TextBox 6"/>
@@ -10294,8 +9971,8 @@
             </p:nvSpPr>
             <p:spPr>
               <a:xfrm>
-                <a:off x="5653623" y="22129703"/>
-                <a:ext cx="9393918" cy="2123658"/>
+                <a:off x="6014299" y="21262476"/>
+                <a:ext cx="8672566" cy="3323987"/>
               </a:xfrm>
               <a:prstGeom prst="rect">
                 <a:avLst/>
@@ -10303,7 +9980,7 @@
               <a:blipFill rotWithShape="1">
                 <a:blip r:embed="rId5"/>
                 <a:stretch>
-                  <a:fillRect l="-2466" t="-8309" r="-2466" b="-12321"/>
+                  <a:fillRect l="-3305" t="-6239" r="-3305" b="-9358"/>
                 </a:stretch>
               </a:blipFill>
             </p:spPr>
@@ -10330,8 +10007,8 @@
         </p:nvSpPr>
         <p:spPr>
           <a:xfrm>
-            <a:off x="16680438" y="22203276"/>
-            <a:ext cx="7584127" cy="2566857"/>
+            <a:off x="16301328" y="21336049"/>
+            <a:ext cx="8342348" cy="2806922"/>
           </a:xfrm>
           <a:prstGeom prst="rect">
             <a:avLst/>
@@ -10346,20 +10023,20 @@
           <a:p>
             <a:pPr algn="ctr"/>
             <a:r>
-              <a:rPr lang="sv-SE" sz="4800" dirty="0" smtClean="0"/>
+              <a:rPr lang="sv-SE" sz="5400" dirty="0" smtClean="0"/>
               <a:t>Calculate weighted sum of</a:t>
             </a:r>
           </a:p>
           <a:p>
             <a:pPr algn="ctr"/>
             <a:r>
-              <a:rPr lang="sv-SE" sz="4800" dirty="0" smtClean="0"/>
+              <a:rPr lang="sv-SE" sz="5400" dirty="0" smtClean="0"/>
               <a:t>outputs for each pixel</a:t>
             </a:r>
-            <a:endParaRPr lang="sv-SE" sz="4800" dirty="0"/>
-          </a:p>
-          <a:p>
-            <a:endParaRPr lang="en-GB" dirty="0"/>
+            <a:endParaRPr lang="sv-SE" sz="5400" dirty="0"/>
+          </a:p>
+          <a:p>
+            <a:endParaRPr lang="en-GB" sz="4800" dirty="0"/>
           </a:p>
         </p:txBody>
       </p:sp>
@@ -10371,8 +10048,8 @@
         </p:nvSpPr>
         <p:spPr>
           <a:xfrm>
-            <a:off x="27144885" y="21892944"/>
-            <a:ext cx="7451079" cy="3453253"/>
+            <a:off x="26796232" y="21025717"/>
+            <a:ext cx="8148386" cy="2917722"/>
           </a:xfrm>
           <a:prstGeom prst="rect">
             <a:avLst/>
@@ -10387,27 +10064,28 @@
           <a:p>
             <a:pPr algn="ctr"/>
             <a:r>
-              <a:rPr lang="sv-SE" sz="4800" dirty="0" smtClean="0"/>
+              <a:rPr lang="sv-SE" sz="5400" dirty="0" smtClean="0"/>
               <a:t>These form a feature map</a:t>
             </a:r>
           </a:p>
           <a:p>
             <a:pPr algn="ctr"/>
             <a:r>
-              <a:rPr lang="sv-SE" sz="4800" dirty="0" smtClean="0"/>
+              <a:rPr lang="sv-SE" sz="5400" dirty="0" smtClean="0"/>
               <a:t>which can be used in</a:t>
             </a:r>
           </a:p>
           <a:p>
             <a:pPr algn="ctr"/>
             <a:r>
-              <a:rPr lang="sv-SE" sz="4800" dirty="0" smtClean="0"/>
-              <a:t>further layers</a:t>
+              <a:rPr lang="sv-SE" sz="5400" dirty="0" smtClean="0"/>
+              <a:t>further </a:t>
             </a:r>
-            <a:endParaRPr lang="sv-SE" sz="4800" dirty="0"/>
-          </a:p>
-          <a:p>
-            <a:endParaRPr lang="en-GB" dirty="0"/>
+            <a:r>
+              <a:rPr lang="sv-SE" sz="5400" dirty="0" smtClean="0"/>
+              <a:t>layers</a:t>
+            </a:r>
+            <a:endParaRPr lang="sv-SE" sz="5400" dirty="0"/>
           </a:p>
         </p:txBody>
       </p:sp>
@@ -10424,9 +10102,237 @@
   <p:timing>
     <p:tnLst>
       <p:par>
-        <p:cTn id="1" dur="indefinite" restart="never" nodeType="tmRoot"/>
+        <p:cTn id="1" dur="indefinite" restart="never" nodeType="tmRoot">
+          <p:childTnLst>
+            <p:seq concurrent="1" nextAc="seek">
+              <p:cTn id="2" dur="indefinite" nodeType="mainSeq">
+                <p:childTnLst>
+                  <p:par>
+                    <p:cTn id="3" fill="hold">
+                      <p:stCondLst>
+                        <p:cond delay="indefinite"/>
+                      </p:stCondLst>
+                      <p:childTnLst>
+                        <p:par>
+                          <p:cTn id="4" fill="hold">
+                            <p:stCondLst>
+                              <p:cond delay="0"/>
+                            </p:stCondLst>
+                            <p:childTnLst>
+                              <p:par>
+                                <p:cTn id="5" presetID="1" presetClass="entr" presetSubtype="0" fill="hold" grpId="0" nodeType="clickEffect">
+                                  <p:stCondLst>
+                                    <p:cond delay="0"/>
+                                  </p:stCondLst>
+                                  <p:childTnLst>
+                                    <p:set>
+                                      <p:cBhvr>
+                                        <p:cTn id="6" dur="1" fill="hold">
+                                          <p:stCondLst>
+                                            <p:cond delay="0"/>
+                                          </p:stCondLst>
+                                        </p:cTn>
+                                        <p:tgtEl>
+                                          <p:spTgt spid="4"/>
+                                        </p:tgtEl>
+                                        <p:attrNameLst>
+                                          <p:attrName>style.visibility</p:attrName>
+                                        </p:attrNameLst>
+                                      </p:cBhvr>
+                                      <p:to>
+                                        <p:strVal val="visible"/>
+                                      </p:to>
+                                    </p:set>
+                                  </p:childTnLst>
+                                </p:cTn>
+                              </p:par>
+                              <p:par>
+                                <p:cTn id="7" presetID="1" presetClass="entr" presetSubtype="0" fill="hold" grpId="0" nodeType="withEffect">
+                                  <p:stCondLst>
+                                    <p:cond delay="0"/>
+                                  </p:stCondLst>
+                                  <p:childTnLst>
+                                    <p:set>
+                                      <p:cBhvr>
+                                        <p:cTn id="8" dur="1" fill="hold">
+                                          <p:stCondLst>
+                                            <p:cond delay="0"/>
+                                          </p:stCondLst>
+                                        </p:cTn>
+                                        <p:tgtEl>
+                                          <p:spTgt spid="5"/>
+                                        </p:tgtEl>
+                                        <p:attrNameLst>
+                                          <p:attrName>style.visibility</p:attrName>
+                                        </p:attrNameLst>
+                                      </p:cBhvr>
+                                      <p:to>
+                                        <p:strVal val="visible"/>
+                                      </p:to>
+                                    </p:set>
+                                  </p:childTnLst>
+                                </p:cTn>
+                              </p:par>
+                              <p:par>
+                                <p:cTn id="9" presetID="1" presetClass="entr" presetSubtype="0" fill="hold" grpId="0" nodeType="withEffect">
+                                  <p:stCondLst>
+                                    <p:cond delay="0"/>
+                                  </p:stCondLst>
+                                  <p:childTnLst>
+                                    <p:set>
+                                      <p:cBhvr>
+                                        <p:cTn id="10" dur="1" fill="hold">
+                                          <p:stCondLst>
+                                            <p:cond delay="0"/>
+                                          </p:stCondLst>
+                                        </p:cTn>
+                                        <p:tgtEl>
+                                          <p:spTgt spid="13"/>
+                                        </p:tgtEl>
+                                        <p:attrNameLst>
+                                          <p:attrName>style.visibility</p:attrName>
+                                        </p:attrNameLst>
+                                      </p:cBhvr>
+                                      <p:to>
+                                        <p:strVal val="visible"/>
+                                      </p:to>
+                                    </p:set>
+                                  </p:childTnLst>
+                                </p:cTn>
+                              </p:par>
+                            </p:childTnLst>
+                          </p:cTn>
+                        </p:par>
+                      </p:childTnLst>
+                    </p:cTn>
+                  </p:par>
+                  <p:par>
+                    <p:cTn id="11" fill="hold">
+                      <p:stCondLst>
+                        <p:cond delay="indefinite"/>
+                      </p:stCondLst>
+                      <p:childTnLst>
+                        <p:par>
+                          <p:cTn id="12" fill="hold">
+                            <p:stCondLst>
+                              <p:cond delay="0"/>
+                            </p:stCondLst>
+                            <p:childTnLst>
+                              <p:par>
+                                <p:cTn id="13" presetID="1" presetClass="entr" presetSubtype="0" fill="hold" grpId="0" nodeType="clickEffect">
+                                  <p:stCondLst>
+                                    <p:cond delay="0"/>
+                                  </p:stCondLst>
+                                  <p:childTnLst>
+                                    <p:set>
+                                      <p:cBhvr>
+                                        <p:cTn id="14" dur="1" fill="hold">
+                                          <p:stCondLst>
+                                            <p:cond delay="0"/>
+                                          </p:stCondLst>
+                                        </p:cTn>
+                                        <p:tgtEl>
+                                          <p:spTgt spid="10"/>
+                                        </p:tgtEl>
+                                        <p:attrNameLst>
+                                          <p:attrName>style.visibility</p:attrName>
+                                        </p:attrNameLst>
+                                      </p:cBhvr>
+                                      <p:to>
+                                        <p:strVal val="visible"/>
+                                      </p:to>
+                                    </p:set>
+                                  </p:childTnLst>
+                                </p:cTn>
+                              </p:par>
+                              <p:par>
+                                <p:cTn id="15" presetID="1" presetClass="entr" presetSubtype="0" fill="hold" nodeType="withEffect">
+                                  <p:stCondLst>
+                                    <p:cond delay="0"/>
+                                  </p:stCondLst>
+                                  <p:childTnLst>
+                                    <p:set>
+                                      <p:cBhvr>
+                                        <p:cTn id="16" dur="1" fill="hold">
+                                          <p:stCondLst>
+                                            <p:cond delay="0"/>
+                                          </p:stCondLst>
+                                        </p:cTn>
+                                        <p:tgtEl>
+                                          <p:spTgt spid="11"/>
+                                        </p:tgtEl>
+                                        <p:attrNameLst>
+                                          <p:attrName>style.visibility</p:attrName>
+                                        </p:attrNameLst>
+                                      </p:cBhvr>
+                                      <p:to>
+                                        <p:strVal val="visible"/>
+                                      </p:to>
+                                    </p:set>
+                                  </p:childTnLst>
+                                </p:cTn>
+                              </p:par>
+                              <p:par>
+                                <p:cTn id="17" presetID="1" presetClass="entr" presetSubtype="0" fill="hold" grpId="0" nodeType="withEffect">
+                                  <p:stCondLst>
+                                    <p:cond delay="0"/>
+                                  </p:stCondLst>
+                                  <p:childTnLst>
+                                    <p:set>
+                                      <p:cBhvr>
+                                        <p:cTn id="18" dur="1" fill="hold">
+                                          <p:stCondLst>
+                                            <p:cond delay="0"/>
+                                          </p:stCondLst>
+                                        </p:cTn>
+                                        <p:tgtEl>
+                                          <p:spTgt spid="14"/>
+                                        </p:tgtEl>
+                                        <p:attrNameLst>
+                                          <p:attrName>style.visibility</p:attrName>
+                                        </p:attrNameLst>
+                                      </p:cBhvr>
+                                      <p:to>
+                                        <p:strVal val="visible"/>
+                                      </p:to>
+                                    </p:set>
+                                  </p:childTnLst>
+                                </p:cTn>
+                              </p:par>
+                            </p:childTnLst>
+                          </p:cTn>
+                        </p:par>
+                      </p:childTnLst>
+                    </p:cTn>
+                  </p:par>
+                </p:childTnLst>
+              </p:cTn>
+              <p:prevCondLst>
+                <p:cond evt="onPrev" delay="0">
+                  <p:tgtEl>
+                    <p:sldTgt/>
+                  </p:tgtEl>
+                </p:cond>
+              </p:prevCondLst>
+              <p:nextCondLst>
+                <p:cond evt="onNext" delay="0">
+                  <p:tgtEl>
+                    <p:sldTgt/>
+                  </p:tgtEl>
+                </p:cond>
+              </p:nextCondLst>
+            </p:seq>
+          </p:childTnLst>
+        </p:cTn>
       </p:par>
     </p:tnLst>
+    <p:bldLst>
+      <p:bldP spid="4" grpId="0"/>
+      <p:bldP spid="5" grpId="0" animBg="1"/>
+      <p:bldP spid="10" grpId="0" animBg="1"/>
+      <p:bldP spid="13" grpId="0"/>
+      <p:bldP spid="14" grpId="0"/>
+    </p:bldLst>
   </p:timing>
 </p:sld>
 </file>
@@ -13453,11 +13359,7 @@
             <a:pPr algn="ctr"/>
             <a:r>
               <a:rPr lang="sv-SE" sz="7000" b="1" dirty="0" smtClean="0"/>
-              <a:t> </a:t>
-            </a:r>
-            <a:r>
-              <a:rPr lang="sv-SE" sz="7000" b="1" dirty="0" smtClean="0"/>
-              <a:t>Layer</a:t>
+              <a:t> Layer</a:t>
             </a:r>
             <a:endParaRPr lang="en-GB" sz="7000" b="1" dirty="0"/>
           </a:p>

</xml_diff>

<commit_message>
Changes to juefei slide
</commit_message>
<xml_diff>
--- a/presentation.pptx
+++ b/presentation.pptx
@@ -1314,11 +1314,7 @@
             </a:pPr>
             <a:r>
               <a:rPr lang="en-GB" dirty="0" smtClean="0"/>
-              <a:t>Expand on black/white board. Show binary string </a:t>
-            </a:r>
-            <a:r>
-              <a:rPr lang="en-GB" dirty="0" smtClean="0"/>
-              <a:t>representation (</a:t>
+              <a:t>Expand on black/white board. Show binary string representation (</a:t>
             </a:r>
             <a:r>
               <a:rPr lang="en-GB" dirty="0" err="1" smtClean="0"/>
@@ -1326,11 +1322,7 @@
             </a:r>
             <a:r>
               <a:rPr lang="en-GB" dirty="0" smtClean="0"/>
-              <a:t> 203, rot 151) </a:t>
-            </a:r>
-            <a:r>
-              <a:rPr lang="en-GB" dirty="0" smtClean="0"/>
-              <a:t>and rotational</a:t>
+              <a:t> 203, rot 151) and rotational</a:t>
             </a:r>
             <a:r>
               <a:rPr lang="en-GB" baseline="0" dirty="0" smtClean="0"/>
@@ -7638,145 +7630,62 @@
           <a:p>
             <a:r>
               <a:rPr lang="sv-SE" sz="14400" dirty="0" smtClean="0"/>
-              <a:t>Model 1: Juefei-Xu et al.</a:t>
+              <a:t>Model 1: Juefei-Xu et al</a:t>
+            </a:r>
+            <a:r>
+              <a:rPr lang="sv-SE" sz="14400" dirty="0" smtClean="0"/>
+              <a:t>.	</a:t>
             </a:r>
             <a:endParaRPr lang="en-GB" sz="14400" dirty="0"/>
           </a:p>
         </p:txBody>
       </p:sp>
-      <mc:AlternateContent xmlns:mc="http://schemas.openxmlformats.org/markup-compatibility/2006">
-        <mc:Choice xmlns:a14="http://schemas.microsoft.com/office/drawing/2010/main" Requires="a14">
-          <p:sp>
-            <p:nvSpPr>
-              <p:cNvPr id="3" name="Content Placeholder 2"/>
-              <p:cNvSpPr>
-                <a:spLocks noGrp="1"/>
-              </p:cNvSpPr>
-              <p:nvPr>
-                <p:ph idx="1"/>
-              </p:nvPr>
-            </p:nvSpPr>
-            <p:spPr>
-              <a:xfrm>
-                <a:off x="7270677" y="4751909"/>
-                <a:ext cx="27779663" cy="17640300"/>
-              </a:xfrm>
-            </p:spPr>
-            <p:txBody>
-              <a:bodyPr/>
-              <a:lstStyle/>
-              <a:p>
-                <a:r>
-                  <a:rPr lang="sv-SE" sz="9200" dirty="0" smtClean="0"/>
-                  <a:t>Idea: Fixed LBP-inspired convolutional layers</a:t>
-                </a:r>
-              </a:p>
-              <a:p>
-                <a:r>
-                  <a:rPr lang="sv-SE" sz="9200" dirty="0" smtClean="0"/>
-                  <a:t>LBCCN Module</a:t>
-                </a:r>
-              </a:p>
-              <a:p>
-                <a:pPr lvl="1"/>
-                <a:r>
-                  <a:rPr lang="sv-SE" sz="8000" dirty="0" smtClean="0"/>
-                  <a:t>3x3 filters with randomly arranged values of 1 and -1</a:t>
-                </a:r>
-              </a:p>
-              <a:p>
-                <a:pPr lvl="1"/>
-                <a:r>
-                  <a:rPr lang="sv-SE" sz="8000" dirty="0" smtClean="0"/>
-                  <a:t>Multiply </a:t>
-                </a:r>
-                <a:r>
-                  <a:rPr lang="sv-SE" sz="8000" dirty="0" smtClean="0"/>
-                  <a:t>each output by learnable constant </a:t>
-                </a:r>
-                <a14:m>
-                  <m:oMath xmlns:m="http://schemas.openxmlformats.org/officeDocument/2006/math">
-                    <m:r>
-                      <a:rPr lang="en-GB" sz="8000" i="1">
-                        <a:latin typeface="Cambria Math"/>
-                      </a:rPr>
-                      <m:t>𝑣</m:t>
-                    </m:r>
-                  </m:oMath>
-                </a14:m>
-                <a:endParaRPr lang="sv-SE" sz="8000" dirty="0" smtClean="0"/>
-              </a:p>
-              <a:p>
-                <a:pPr marL="0" indent="0">
-                  <a:buNone/>
-                </a:pPr>
-                <a:endParaRPr lang="sv-SE" sz="9200" dirty="0" smtClean="0"/>
-              </a:p>
-              <a:p>
-                <a:pPr marL="0" indent="0">
-                  <a:buNone/>
-                </a:pPr>
-                <a:endParaRPr lang="sv-SE" sz="9200" dirty="0"/>
-              </a:p>
-              <a:p>
-                <a:pPr marL="0" indent="0">
-                  <a:buNone/>
-                </a:pPr>
-                <a:endParaRPr lang="sv-SE" sz="9200" dirty="0" smtClean="0"/>
-              </a:p>
-              <a:p>
-                <a:pPr marL="0" indent="0">
-                  <a:buNone/>
-                </a:pPr>
-                <a:endParaRPr lang="sv-SE" sz="9200" dirty="0"/>
-              </a:p>
-              <a:p>
-                <a:pPr marL="0" indent="0">
-                  <a:buNone/>
-                </a:pPr>
-                <a:endParaRPr lang="sv-SE" sz="9200" dirty="0" smtClean="0"/>
-              </a:p>
-            </p:txBody>
-          </p:sp>
-        </mc:Choice>
-        <mc:Fallback>
-          <p:sp>
-            <p:nvSpPr>
-              <p:cNvPr id="3" name="Content Placeholder 2"/>
-              <p:cNvSpPr>
-                <a:spLocks noGrp="1" noRot="1" noChangeAspect="1" noMove="1" noResize="1" noEditPoints="1" noAdjustHandles="1" noChangeArrowheads="1" noChangeShapeType="1" noTextEdit="1"/>
-              </p:cNvSpPr>
-              <p:nvPr>
-                <p:ph idx="1"/>
-              </p:nvPr>
-            </p:nvSpPr>
-            <p:spPr>
-              <a:xfrm>
-                <a:off x="7270677" y="4751909"/>
-                <a:ext cx="27779663" cy="17640300"/>
-              </a:xfrm>
-              <a:blipFill rotWithShape="1">
-                <a:blip r:embed="rId2"/>
-                <a:stretch>
-                  <a:fillRect l="-1097" t="-1002"/>
-                </a:stretch>
-              </a:blipFill>
-            </p:spPr>
-            <p:txBody>
-              <a:bodyPr/>
-              <a:lstStyle/>
-              <a:p>
-                <a:r>
-                  <a:rPr lang="en-GB">
-                    <a:noFill/>
-                  </a:rPr>
-                  <a:t> </a:t>
-                </a:r>
-              </a:p>
-            </p:txBody>
-          </p:sp>
-        </mc:Fallback>
-      </mc:AlternateContent>
+      <p:sp>
+        <p:nvSpPr>
+          <p:cNvPr id="3" name="Content Placeholder 2"/>
+          <p:cNvSpPr>
+            <a:spLocks noGrp="1"/>
+          </p:cNvSpPr>
+          <p:nvPr>
+            <p:ph idx="1"/>
+          </p:nvPr>
+        </p:nvSpPr>
+        <p:spPr>
+          <a:xfrm>
+            <a:off x="7270677" y="4751909"/>
+            <a:ext cx="27779663" cy="5544616"/>
+          </a:xfrm>
+        </p:spPr>
+        <p:txBody>
+          <a:bodyPr/>
+          <a:lstStyle/>
+          <a:p>
+            <a:r>
+              <a:rPr lang="sv-SE" sz="9200" dirty="0" smtClean="0"/>
+              <a:t>Idea: Fixed LBP-inspired convolutional layers</a:t>
+            </a:r>
+          </a:p>
+          <a:p>
+            <a:r>
+              <a:rPr lang="sv-SE" sz="9200" dirty="0" smtClean="0"/>
+              <a:t>LBCNN Module</a:t>
+            </a:r>
+            <a:endParaRPr lang="sv-SE" sz="9200" dirty="0" smtClean="0"/>
+          </a:p>
+          <a:p>
+            <a:pPr marL="0" indent="0">
+              <a:buNone/>
+            </a:pPr>
+            <a:endParaRPr lang="sv-SE" sz="9200" dirty="0"/>
+          </a:p>
+          <a:p>
+            <a:pPr marL="0" indent="0">
+              <a:buNone/>
+            </a:pPr>
+            <a:endParaRPr lang="sv-SE" sz="9200" dirty="0" smtClean="0"/>
+          </a:p>
+        </p:txBody>
+      </p:sp>
       <p:graphicFrame>
         <p:nvGraphicFramePr>
           <p:cNvPr id="20" name="Table 19"/>
@@ -8299,8 +8208,8 @@
           </a:graphicData>
         </a:graphic>
       </p:graphicFrame>
-      <mc:AlternateContent xmlns:mc="http://schemas.openxmlformats.org/markup-compatibility/2006">
-        <mc:Choice xmlns:a14="http://schemas.microsoft.com/office/drawing/2010/main" Requires="a14">
+      <mc:AlternateContent xmlns:mc="http://schemas.openxmlformats.org/markup-compatibility/2006" xmlns:a14="http://schemas.microsoft.com/office/drawing/2010/main">
+        <mc:Choice Requires="a14">
           <p:sp>
             <p:nvSpPr>
               <p:cNvPr id="4" name="TextBox 3"/>
@@ -8452,7 +8361,7 @@
             </p:txBody>
           </p:sp>
         </mc:Choice>
-        <mc:Fallback>
+        <mc:Fallback xmlns="">
           <p:sp>
             <p:nvSpPr>
               <p:cNvPr id="4" name="TextBox 3"/>
@@ -8565,8 +8474,8 @@
           </a:p>
         </p:txBody>
       </p:sp>
-      <mc:AlternateContent xmlns:mc="http://schemas.openxmlformats.org/markup-compatibility/2006">
-        <mc:Choice xmlns:a14="http://schemas.microsoft.com/office/drawing/2010/main" Requires="a14">
+      <mc:AlternateContent xmlns:mc="http://schemas.openxmlformats.org/markup-compatibility/2006" xmlns:a14="http://schemas.microsoft.com/office/drawing/2010/main">
+        <mc:Choice Requires="a14">
           <p:sp>
             <p:nvSpPr>
               <p:cNvPr id="6" name="TextBox 5"/>
@@ -8610,7 +8519,7 @@
             </p:txBody>
           </p:sp>
         </mc:Choice>
-        <mc:Fallback>
+        <mc:Fallback xmlns="">
           <p:sp>
             <p:nvSpPr>
               <p:cNvPr id="6" name="TextBox 5"/>
@@ -9883,8 +9792,8 @@
           </a:graphicData>
         </a:graphic>
       </p:graphicFrame>
-      <mc:AlternateContent xmlns:mc="http://schemas.openxmlformats.org/markup-compatibility/2006">
-        <mc:Choice xmlns:a14="http://schemas.microsoft.com/office/drawing/2010/main" Requires="a14">
+      <mc:AlternateContent xmlns:mc="http://schemas.openxmlformats.org/markup-compatibility/2006" xmlns:a14="http://schemas.microsoft.com/office/drawing/2010/main">
+        <mc:Choice Requires="a14">
           <p:sp>
             <p:nvSpPr>
               <p:cNvPr id="7" name="TextBox 6"/>
@@ -9924,19 +9833,13 @@
                   <a:rPr lang="sv-SE" sz="5400" dirty="0" smtClean="0"/>
                   <a:t>fixed convolutional </a:t>
                 </a:r>
-                <a:endParaRPr lang="sv-SE" sz="5400" dirty="0" smtClean="0"/>
               </a:p>
               <a:p>
                 <a:pPr algn="ctr"/>
                 <a:r>
                   <a:rPr lang="sv-SE" sz="5400" dirty="0" smtClean="0"/>
-                  <a:t>filters to </a:t>
+                  <a:t>filters to image, giving </a:t>
                 </a:r>
-                <a:r>
-                  <a:rPr lang="sv-SE" sz="5400" dirty="0" smtClean="0"/>
-                  <a:t>image, giving </a:t>
-                </a:r>
-                <a:endParaRPr lang="sv-SE" sz="5400" dirty="0" smtClean="0"/>
               </a:p>
               <a:p>
                 <a:pPr algn="ctr"/>
@@ -9960,7 +9863,7 @@
             </p:txBody>
           </p:sp>
         </mc:Choice>
-        <mc:Fallback>
+        <mc:Fallback xmlns="">
           <p:sp>
             <p:nvSpPr>
               <p:cNvPr id="7" name="TextBox 6"/>
@@ -10079,13 +9982,721 @@
             <a:pPr algn="ctr"/>
             <a:r>
               <a:rPr lang="sv-SE" sz="5400" dirty="0" smtClean="0"/>
-              <a:t>further </a:t>
+              <a:t>further layers</a:t>
+            </a:r>
+            <a:endParaRPr lang="sv-SE" sz="5400" dirty="0"/>
+          </a:p>
+        </p:txBody>
+      </p:sp>
+      <mc:AlternateContent xmlns:mc="http://schemas.openxmlformats.org/markup-compatibility/2006">
+        <mc:Choice xmlns:a14="http://schemas.microsoft.com/office/drawing/2010/main" Requires="a14">
+          <p:sp>
+            <p:nvSpPr>
+              <p:cNvPr id="15" name="Content Placeholder 2"/>
+              <p:cNvSpPr txBox="1">
+                <a:spLocks/>
+              </p:cNvSpPr>
+              <p:nvPr/>
+            </p:nvSpPr>
+            <p:spPr bwMode="auto">
+              <a:xfrm>
+                <a:off x="7358110" y="9648453"/>
+                <a:ext cx="27779663" cy="1728192"/>
+              </a:xfrm>
+              <a:prstGeom prst="rect">
+                <a:avLst/>
+              </a:prstGeom>
+              <a:noFill/>
+              <a:ln>
+                <a:noFill/>
+              </a:ln>
+              <a:effectLst/>
+              <a:extLst>
+                <a:ext uri="{909E8E84-426E-40DD-AFC4-6F175D3DCCD1}">
+                  <a14:hiddenFill>
+                    <a:solidFill>
+                      <a:schemeClr val="accent1"/>
+                    </a:solidFill>
+                  </a14:hiddenFill>
+                </a:ext>
+                <a:ext uri="{91240B29-F687-4F45-9708-019B960494DF}">
+                  <a14:hiddenLine w="9525">
+                    <a:solidFill>
+                      <a:schemeClr val="tx1"/>
+                    </a:solidFill>
+                    <a:miter lim="800000"/>
+                    <a:headEnd/>
+                    <a:tailEnd/>
+                  </a14:hiddenLine>
+                </a:ext>
+                <a:ext uri="{AF507438-7753-43E0-B8FC-AC1667EBCBE1}">
+                  <a14:hiddenEffects>
+                    <a:effectLst>
+                      <a:outerShdw dist="35921" dir="2700000" algn="ctr" rotWithShape="0">
+                        <a:schemeClr val="bg2"/>
+                      </a:outerShdw>
+                    </a:effectLst>
+                  </a14:hiddenEffects>
+                </a:ext>
+              </a:extLst>
+            </p:spPr>
+            <p:txBody>
+              <a:bodyPr vert="horz" wrap="square" lIns="349592" tIns="174796" rIns="349592" bIns="174796" numCol="1" anchor="t" anchorCtr="0" compatLnSpc="1">
+                <a:prstTxWarp prst="textNoShape">
+                  <a:avLst/>
+                </a:prstTxWarp>
+              </a:bodyPr>
+              <a:lstStyle>
+                <a:lvl1pPr marL="1311275" indent="-1311275" algn="l" defTabSz="3495675" rtl="0" fontAlgn="base">
+                  <a:spcBef>
+                    <a:spcPct val="20000"/>
+                  </a:spcBef>
+                  <a:spcAft>
+                    <a:spcPct val="0"/>
+                  </a:spcAft>
+                  <a:buChar char="•"/>
+                  <a:defRPr sz="10200">
+                    <a:solidFill>
+                      <a:schemeClr val="tx1"/>
+                    </a:solidFill>
+                    <a:latin typeface="+mn-lt"/>
+                    <a:ea typeface="+mn-ea"/>
+                    <a:cs typeface="+mn-cs"/>
+                  </a:defRPr>
+                </a:lvl1pPr>
+                <a:lvl2pPr marL="2838450" indent="-1089025" algn="l" defTabSz="3495675" rtl="0" fontAlgn="base">
+                  <a:spcBef>
+                    <a:spcPct val="20000"/>
+                  </a:spcBef>
+                  <a:spcAft>
+                    <a:spcPct val="0"/>
+                  </a:spcAft>
+                  <a:buChar char="–"/>
+                  <a:defRPr sz="9000">
+                    <a:solidFill>
+                      <a:schemeClr val="tx1"/>
+                    </a:solidFill>
+                    <a:latin typeface="+mn-lt"/>
+                  </a:defRPr>
+                </a:lvl2pPr>
+                <a:lvl3pPr marL="4368800" indent="-873125" algn="l" defTabSz="3495675" rtl="0" fontAlgn="base">
+                  <a:spcBef>
+                    <a:spcPct val="20000"/>
+                  </a:spcBef>
+                  <a:spcAft>
+                    <a:spcPct val="0"/>
+                  </a:spcAft>
+                  <a:buChar char="•"/>
+                  <a:defRPr sz="7500">
+                    <a:solidFill>
+                      <a:schemeClr val="tx1"/>
+                    </a:solidFill>
+                    <a:latin typeface="+mn-lt"/>
+                  </a:defRPr>
+                </a:lvl3pPr>
+                <a:lvl4pPr marL="6119813" indent="-876300" algn="l" defTabSz="3495675" rtl="0" fontAlgn="base">
+                  <a:spcBef>
+                    <a:spcPct val="20000"/>
+                  </a:spcBef>
+                  <a:spcAft>
+                    <a:spcPct val="0"/>
+                  </a:spcAft>
+                  <a:buChar char="–"/>
+                  <a:defRPr sz="6400">
+                    <a:solidFill>
+                      <a:schemeClr val="tx1"/>
+                    </a:solidFill>
+                    <a:latin typeface="+mn-lt"/>
+                  </a:defRPr>
+                </a:lvl4pPr>
+                <a:lvl5pPr marL="7867650" indent="-874713" algn="l" defTabSz="3495675" rtl="0" fontAlgn="base">
+                  <a:spcBef>
+                    <a:spcPct val="20000"/>
+                  </a:spcBef>
+                  <a:spcAft>
+                    <a:spcPct val="0"/>
+                  </a:spcAft>
+                  <a:buChar char="»"/>
+                  <a:defRPr sz="6400">
+                    <a:solidFill>
+                      <a:schemeClr val="tx1"/>
+                    </a:solidFill>
+                    <a:latin typeface="+mn-lt"/>
+                  </a:defRPr>
+                </a:lvl5pPr>
+                <a:lvl6pPr marL="8324850" indent="-874713" algn="l" defTabSz="3495675" rtl="0" fontAlgn="base">
+                  <a:spcBef>
+                    <a:spcPct val="20000"/>
+                  </a:spcBef>
+                  <a:spcAft>
+                    <a:spcPct val="0"/>
+                  </a:spcAft>
+                  <a:buChar char="»"/>
+                  <a:defRPr sz="6400">
+                    <a:solidFill>
+                      <a:schemeClr val="tx1"/>
+                    </a:solidFill>
+                    <a:latin typeface="+mn-lt"/>
+                  </a:defRPr>
+                </a:lvl6pPr>
+                <a:lvl7pPr marL="8782050" indent="-874713" algn="l" defTabSz="3495675" rtl="0" fontAlgn="base">
+                  <a:spcBef>
+                    <a:spcPct val="20000"/>
+                  </a:spcBef>
+                  <a:spcAft>
+                    <a:spcPct val="0"/>
+                  </a:spcAft>
+                  <a:buChar char="»"/>
+                  <a:defRPr sz="6400">
+                    <a:solidFill>
+                      <a:schemeClr val="tx1"/>
+                    </a:solidFill>
+                    <a:latin typeface="+mn-lt"/>
+                  </a:defRPr>
+                </a:lvl7pPr>
+                <a:lvl8pPr marL="9239250" indent="-874713" algn="l" defTabSz="3495675" rtl="0" fontAlgn="base">
+                  <a:spcBef>
+                    <a:spcPct val="20000"/>
+                  </a:spcBef>
+                  <a:spcAft>
+                    <a:spcPct val="0"/>
+                  </a:spcAft>
+                  <a:buChar char="»"/>
+                  <a:defRPr sz="6400">
+                    <a:solidFill>
+                      <a:schemeClr val="tx1"/>
+                    </a:solidFill>
+                    <a:latin typeface="+mn-lt"/>
+                  </a:defRPr>
+                </a:lvl8pPr>
+                <a:lvl9pPr marL="9696450" indent="-874713" algn="l" defTabSz="3495675" rtl="0" fontAlgn="base">
+                  <a:spcBef>
+                    <a:spcPct val="20000"/>
+                  </a:spcBef>
+                  <a:spcAft>
+                    <a:spcPct val="0"/>
+                  </a:spcAft>
+                  <a:buChar char="»"/>
+                  <a:defRPr sz="6400">
+                    <a:solidFill>
+                      <a:schemeClr val="tx1"/>
+                    </a:solidFill>
+                    <a:latin typeface="+mn-lt"/>
+                  </a:defRPr>
+                </a:lvl9pPr>
+              </a:lstStyle>
+              <a:p>
+                <a:pPr lvl="1"/>
+                <a:r>
+                  <a:rPr lang="sv-SE" sz="8000" dirty="0"/>
+                  <a:t>Multiply </a:t>
+                </a:r>
+                <a:r>
+                  <a:rPr lang="sv-SE" sz="8000" dirty="0"/>
+                  <a:t>each output by learnable constant </a:t>
+                </a:r>
+                <a14:m>
+                  <m:oMath xmlns:m="http://schemas.openxmlformats.org/officeDocument/2006/math">
+                    <m:r>
+                      <a:rPr lang="en-GB" sz="8000"/>
+                      <m:t>𝑣</m:t>
+                    </m:r>
+                  </m:oMath>
+                </a14:m>
+                <a:endParaRPr lang="sv-SE" sz="8000" dirty="0"/>
+              </a:p>
+              <a:p>
+                <a:pPr marL="0" indent="0">
+                  <a:buFontTx/>
+                  <a:buNone/>
+                </a:pPr>
+                <a:endParaRPr lang="sv-SE" sz="9200" kern="0" dirty="0" smtClean="0"/>
+              </a:p>
+            </p:txBody>
+          </p:sp>
+        </mc:Choice>
+        <mc:Fallback>
+          <p:sp>
+            <p:nvSpPr>
+              <p:cNvPr id="15" name="Content Placeholder 2"/>
+              <p:cNvSpPr txBox="1">
+                <a:spLocks noRot="1" noChangeAspect="1" noMove="1" noResize="1" noEditPoints="1" noAdjustHandles="1" noChangeArrowheads="1" noChangeShapeType="1" noTextEdit="1"/>
+              </p:cNvSpPr>
+              <p:nvPr/>
+            </p:nvSpPr>
+            <p:spPr bwMode="auto">
+              <a:xfrm>
+                <a:off x="7358110" y="9648453"/>
+                <a:ext cx="27779663" cy="1728192"/>
+              </a:xfrm>
+              <a:prstGeom prst="rect">
+                <a:avLst/>
+              </a:prstGeom>
+              <a:blipFill rotWithShape="1">
+                <a:blip r:embed="rId6"/>
+                <a:stretch>
+                  <a:fillRect t="-7774" b="-16254"/>
+                </a:stretch>
+              </a:blipFill>
+              <a:ln>
+                <a:noFill/>
+              </a:ln>
+              <a:effectLst/>
+              <a:extLst>
+                <a:ext uri="{909E8E84-426E-40DD-AFC4-6F175D3DCCD1}">
+                  <a14:hiddenFill xmlns:a14="http://schemas.microsoft.com/office/drawing/2010/main">
+                    <a:solidFill>
+                      <a:schemeClr val="accent1"/>
+                    </a:solidFill>
+                  </a14:hiddenFill>
+                </a:ext>
+                <a:ext uri="{91240B29-F687-4F45-9708-019B960494DF}">
+                  <a14:hiddenLine xmlns:a14="http://schemas.microsoft.com/office/drawing/2010/main" w="9525">
+                    <a:solidFill>
+                      <a:schemeClr val="tx1"/>
+                    </a:solidFill>
+                    <a:miter lim="800000"/>
+                    <a:headEnd/>
+                    <a:tailEnd/>
+                  </a14:hiddenLine>
+                </a:ext>
+                <a:ext uri="{AF507438-7753-43E0-B8FC-AC1667EBCBE1}">
+                  <a14:hiddenEffects xmlns:a14="http://schemas.microsoft.com/office/drawing/2010/main">
+                    <a:effectLst>
+                      <a:outerShdw dist="35921" dir="2700000" algn="ctr" rotWithShape="0">
+                        <a:schemeClr val="bg2"/>
+                      </a:outerShdw>
+                    </a:effectLst>
+                  </a14:hiddenEffects>
+                </a:ext>
+              </a:extLst>
+            </p:spPr>
+            <p:txBody>
+              <a:bodyPr/>
+              <a:lstStyle/>
+              <a:p>
+                <a:r>
+                  <a:rPr lang="en-GB">
+                    <a:noFill/>
+                  </a:rPr>
+                  <a:t> </a:t>
+                </a:r>
+              </a:p>
+            </p:txBody>
+          </p:sp>
+        </mc:Fallback>
+      </mc:AlternateContent>
+      <p:sp>
+        <p:nvSpPr>
+          <p:cNvPr id="16" name="Content Placeholder 2"/>
+          <p:cNvSpPr txBox="1">
+            <a:spLocks/>
+          </p:cNvSpPr>
+          <p:nvPr/>
+        </p:nvSpPr>
+        <p:spPr bwMode="auto">
+          <a:xfrm>
+            <a:off x="7358110" y="8208293"/>
+            <a:ext cx="27779663" cy="1728192"/>
+          </a:xfrm>
+          <a:prstGeom prst="rect">
+            <a:avLst/>
+          </a:prstGeom>
+          <a:noFill/>
+          <a:ln>
+            <a:noFill/>
+          </a:ln>
+          <a:effectLst/>
+          <a:extLst>
+            <a:ext uri="{909E8E84-426E-40DD-AFC4-6F175D3DCCD1}">
+              <a14:hiddenFill xmlns:a14="http://schemas.microsoft.com/office/drawing/2010/main">
+                <a:solidFill>
+                  <a:schemeClr val="accent1"/>
+                </a:solidFill>
+              </a14:hiddenFill>
+            </a:ext>
+            <a:ext uri="{91240B29-F687-4F45-9708-019B960494DF}">
+              <a14:hiddenLine xmlns:a14="http://schemas.microsoft.com/office/drawing/2010/main" w="9525">
+                <a:solidFill>
+                  <a:schemeClr val="tx1"/>
+                </a:solidFill>
+                <a:miter lim="800000"/>
+                <a:headEnd/>
+                <a:tailEnd/>
+              </a14:hiddenLine>
+            </a:ext>
+            <a:ext uri="{AF507438-7753-43E0-B8FC-AC1667EBCBE1}">
+              <a14:hiddenEffects xmlns:a14="http://schemas.microsoft.com/office/drawing/2010/main">
+                <a:effectLst>
+                  <a:outerShdw dist="35921" dir="2700000" algn="ctr" rotWithShape="0">
+                    <a:schemeClr val="bg2"/>
+                  </a:outerShdw>
+                </a:effectLst>
+              </a14:hiddenEffects>
+            </a:ext>
+          </a:extLst>
+        </p:spPr>
+        <p:txBody>
+          <a:bodyPr vert="horz" wrap="square" lIns="349592" tIns="174796" rIns="349592" bIns="174796" numCol="1" anchor="t" anchorCtr="0" compatLnSpc="1">
+            <a:prstTxWarp prst="textNoShape">
+              <a:avLst/>
+            </a:prstTxWarp>
+          </a:bodyPr>
+          <a:lstStyle>
+            <a:lvl1pPr marL="1311275" indent="-1311275" algn="l" defTabSz="3495675" rtl="0" fontAlgn="base">
+              <a:spcBef>
+                <a:spcPct val="20000"/>
+              </a:spcBef>
+              <a:spcAft>
+                <a:spcPct val="0"/>
+              </a:spcAft>
+              <a:buChar char="•"/>
+              <a:defRPr sz="10200">
+                <a:solidFill>
+                  <a:schemeClr val="tx1"/>
+                </a:solidFill>
+                <a:latin typeface="+mn-lt"/>
+                <a:ea typeface="+mn-ea"/>
+                <a:cs typeface="+mn-cs"/>
+              </a:defRPr>
+            </a:lvl1pPr>
+            <a:lvl2pPr marL="2838450" indent="-1089025" algn="l" defTabSz="3495675" rtl="0" fontAlgn="base">
+              <a:spcBef>
+                <a:spcPct val="20000"/>
+              </a:spcBef>
+              <a:spcAft>
+                <a:spcPct val="0"/>
+              </a:spcAft>
+              <a:buChar char="–"/>
+              <a:defRPr sz="9000">
+                <a:solidFill>
+                  <a:schemeClr val="tx1"/>
+                </a:solidFill>
+                <a:latin typeface="+mn-lt"/>
+              </a:defRPr>
+            </a:lvl2pPr>
+            <a:lvl3pPr marL="4368800" indent="-873125" algn="l" defTabSz="3495675" rtl="0" fontAlgn="base">
+              <a:spcBef>
+                <a:spcPct val="20000"/>
+              </a:spcBef>
+              <a:spcAft>
+                <a:spcPct val="0"/>
+              </a:spcAft>
+              <a:buChar char="•"/>
+              <a:defRPr sz="7500">
+                <a:solidFill>
+                  <a:schemeClr val="tx1"/>
+                </a:solidFill>
+                <a:latin typeface="+mn-lt"/>
+              </a:defRPr>
+            </a:lvl3pPr>
+            <a:lvl4pPr marL="6119813" indent="-876300" algn="l" defTabSz="3495675" rtl="0" fontAlgn="base">
+              <a:spcBef>
+                <a:spcPct val="20000"/>
+              </a:spcBef>
+              <a:spcAft>
+                <a:spcPct val="0"/>
+              </a:spcAft>
+              <a:buChar char="–"/>
+              <a:defRPr sz="6400">
+                <a:solidFill>
+                  <a:schemeClr val="tx1"/>
+                </a:solidFill>
+                <a:latin typeface="+mn-lt"/>
+              </a:defRPr>
+            </a:lvl4pPr>
+            <a:lvl5pPr marL="7867650" indent="-874713" algn="l" defTabSz="3495675" rtl="0" fontAlgn="base">
+              <a:spcBef>
+                <a:spcPct val="20000"/>
+              </a:spcBef>
+              <a:spcAft>
+                <a:spcPct val="0"/>
+              </a:spcAft>
+              <a:buChar char="»"/>
+              <a:defRPr sz="6400">
+                <a:solidFill>
+                  <a:schemeClr val="tx1"/>
+                </a:solidFill>
+                <a:latin typeface="+mn-lt"/>
+              </a:defRPr>
+            </a:lvl5pPr>
+            <a:lvl6pPr marL="8324850" indent="-874713" algn="l" defTabSz="3495675" rtl="0" fontAlgn="base">
+              <a:spcBef>
+                <a:spcPct val="20000"/>
+              </a:spcBef>
+              <a:spcAft>
+                <a:spcPct val="0"/>
+              </a:spcAft>
+              <a:buChar char="»"/>
+              <a:defRPr sz="6400">
+                <a:solidFill>
+                  <a:schemeClr val="tx1"/>
+                </a:solidFill>
+                <a:latin typeface="+mn-lt"/>
+              </a:defRPr>
+            </a:lvl6pPr>
+            <a:lvl7pPr marL="8782050" indent="-874713" algn="l" defTabSz="3495675" rtl="0" fontAlgn="base">
+              <a:spcBef>
+                <a:spcPct val="20000"/>
+              </a:spcBef>
+              <a:spcAft>
+                <a:spcPct val="0"/>
+              </a:spcAft>
+              <a:buChar char="»"/>
+              <a:defRPr sz="6400">
+                <a:solidFill>
+                  <a:schemeClr val="tx1"/>
+                </a:solidFill>
+                <a:latin typeface="+mn-lt"/>
+              </a:defRPr>
+            </a:lvl7pPr>
+            <a:lvl8pPr marL="9239250" indent="-874713" algn="l" defTabSz="3495675" rtl="0" fontAlgn="base">
+              <a:spcBef>
+                <a:spcPct val="20000"/>
+              </a:spcBef>
+              <a:spcAft>
+                <a:spcPct val="0"/>
+              </a:spcAft>
+              <a:buChar char="»"/>
+              <a:defRPr sz="6400">
+                <a:solidFill>
+                  <a:schemeClr val="tx1"/>
+                </a:solidFill>
+                <a:latin typeface="+mn-lt"/>
+              </a:defRPr>
+            </a:lvl8pPr>
+            <a:lvl9pPr marL="9696450" indent="-874713" algn="l" defTabSz="3495675" rtl="0" fontAlgn="base">
+              <a:spcBef>
+                <a:spcPct val="20000"/>
+              </a:spcBef>
+              <a:spcAft>
+                <a:spcPct val="0"/>
+              </a:spcAft>
+              <a:buChar char="»"/>
+              <a:defRPr sz="6400">
+                <a:solidFill>
+                  <a:schemeClr val="tx1"/>
+                </a:solidFill>
+                <a:latin typeface="+mn-lt"/>
+              </a:defRPr>
+            </a:lvl9pPr>
+          </a:lstStyle>
+          <a:p>
+            <a:pPr lvl="1"/>
+            <a:r>
+              <a:rPr lang="sv-SE" sz="8000" dirty="0"/>
+              <a:t>3x3 filters with randomly arranged values of 1 and -</a:t>
             </a:r>
             <a:r>
-              <a:rPr lang="sv-SE" sz="5400" dirty="0" smtClean="0"/>
-              <a:t>layers</a:t>
+              <a:rPr lang="sv-SE" sz="8000" dirty="0" smtClean="0"/>
+              <a:t>1</a:t>
             </a:r>
-            <a:endParaRPr lang="sv-SE" sz="5400" dirty="0"/>
+            <a:endParaRPr lang="sv-SE" sz="9200" dirty="0"/>
+          </a:p>
+        </p:txBody>
+      </p:sp>
+      <p:sp>
+        <p:nvSpPr>
+          <p:cNvPr id="17" name="Content Placeholder 2"/>
+          <p:cNvSpPr txBox="1">
+            <a:spLocks/>
+          </p:cNvSpPr>
+          <p:nvPr/>
+        </p:nvSpPr>
+        <p:spPr bwMode="auto">
+          <a:xfrm>
+            <a:off x="7358110" y="11299554"/>
+            <a:ext cx="27779663" cy="1728192"/>
+          </a:xfrm>
+          <a:prstGeom prst="rect">
+            <a:avLst/>
+          </a:prstGeom>
+          <a:noFill/>
+          <a:ln>
+            <a:noFill/>
+          </a:ln>
+          <a:effectLst/>
+          <a:extLst>
+            <a:ext uri="{909E8E84-426E-40DD-AFC4-6F175D3DCCD1}">
+              <a14:hiddenFill xmlns:a14="http://schemas.microsoft.com/office/drawing/2010/main">
+                <a:solidFill>
+                  <a:schemeClr val="accent1"/>
+                </a:solidFill>
+              </a14:hiddenFill>
+            </a:ext>
+            <a:ext uri="{91240B29-F687-4F45-9708-019B960494DF}">
+              <a14:hiddenLine xmlns:a14="http://schemas.microsoft.com/office/drawing/2010/main" w="9525">
+                <a:solidFill>
+                  <a:schemeClr val="tx1"/>
+                </a:solidFill>
+                <a:miter lim="800000"/>
+                <a:headEnd/>
+                <a:tailEnd/>
+              </a14:hiddenLine>
+            </a:ext>
+            <a:ext uri="{AF507438-7753-43E0-B8FC-AC1667EBCBE1}">
+              <a14:hiddenEffects xmlns:a14="http://schemas.microsoft.com/office/drawing/2010/main">
+                <a:effectLst>
+                  <a:outerShdw dist="35921" dir="2700000" algn="ctr" rotWithShape="0">
+                    <a:schemeClr val="bg2"/>
+                  </a:outerShdw>
+                </a:effectLst>
+              </a14:hiddenEffects>
+            </a:ext>
+          </a:extLst>
+        </p:spPr>
+        <p:txBody>
+          <a:bodyPr vert="horz" wrap="square" lIns="349592" tIns="174796" rIns="349592" bIns="174796" numCol="1" anchor="t" anchorCtr="0" compatLnSpc="1">
+            <a:prstTxWarp prst="textNoShape">
+              <a:avLst/>
+            </a:prstTxWarp>
+          </a:bodyPr>
+          <a:lstStyle>
+            <a:lvl1pPr marL="1311275" indent="-1311275" algn="l" defTabSz="3495675" rtl="0" fontAlgn="base">
+              <a:spcBef>
+                <a:spcPct val="20000"/>
+              </a:spcBef>
+              <a:spcAft>
+                <a:spcPct val="0"/>
+              </a:spcAft>
+              <a:buChar char="•"/>
+              <a:defRPr sz="10200">
+                <a:solidFill>
+                  <a:schemeClr val="tx1"/>
+                </a:solidFill>
+                <a:latin typeface="+mn-lt"/>
+                <a:ea typeface="+mn-ea"/>
+                <a:cs typeface="+mn-cs"/>
+              </a:defRPr>
+            </a:lvl1pPr>
+            <a:lvl2pPr marL="2838450" indent="-1089025" algn="l" defTabSz="3495675" rtl="0" fontAlgn="base">
+              <a:spcBef>
+                <a:spcPct val="20000"/>
+              </a:spcBef>
+              <a:spcAft>
+                <a:spcPct val="0"/>
+              </a:spcAft>
+              <a:buChar char="–"/>
+              <a:defRPr sz="9000">
+                <a:solidFill>
+                  <a:schemeClr val="tx1"/>
+                </a:solidFill>
+                <a:latin typeface="+mn-lt"/>
+              </a:defRPr>
+            </a:lvl2pPr>
+            <a:lvl3pPr marL="4368800" indent="-873125" algn="l" defTabSz="3495675" rtl="0" fontAlgn="base">
+              <a:spcBef>
+                <a:spcPct val="20000"/>
+              </a:spcBef>
+              <a:spcAft>
+                <a:spcPct val="0"/>
+              </a:spcAft>
+              <a:buChar char="•"/>
+              <a:defRPr sz="7500">
+                <a:solidFill>
+                  <a:schemeClr val="tx1"/>
+                </a:solidFill>
+                <a:latin typeface="+mn-lt"/>
+              </a:defRPr>
+            </a:lvl3pPr>
+            <a:lvl4pPr marL="6119813" indent="-876300" algn="l" defTabSz="3495675" rtl="0" fontAlgn="base">
+              <a:spcBef>
+                <a:spcPct val="20000"/>
+              </a:spcBef>
+              <a:spcAft>
+                <a:spcPct val="0"/>
+              </a:spcAft>
+              <a:buChar char="–"/>
+              <a:defRPr sz="6400">
+                <a:solidFill>
+                  <a:schemeClr val="tx1"/>
+                </a:solidFill>
+                <a:latin typeface="+mn-lt"/>
+              </a:defRPr>
+            </a:lvl4pPr>
+            <a:lvl5pPr marL="7867650" indent="-874713" algn="l" defTabSz="3495675" rtl="0" fontAlgn="base">
+              <a:spcBef>
+                <a:spcPct val="20000"/>
+              </a:spcBef>
+              <a:spcAft>
+                <a:spcPct val="0"/>
+              </a:spcAft>
+              <a:buChar char="»"/>
+              <a:defRPr sz="6400">
+                <a:solidFill>
+                  <a:schemeClr val="tx1"/>
+                </a:solidFill>
+                <a:latin typeface="+mn-lt"/>
+              </a:defRPr>
+            </a:lvl5pPr>
+            <a:lvl6pPr marL="8324850" indent="-874713" algn="l" defTabSz="3495675" rtl="0" fontAlgn="base">
+              <a:spcBef>
+                <a:spcPct val="20000"/>
+              </a:spcBef>
+              <a:spcAft>
+                <a:spcPct val="0"/>
+              </a:spcAft>
+              <a:buChar char="»"/>
+              <a:defRPr sz="6400">
+                <a:solidFill>
+                  <a:schemeClr val="tx1"/>
+                </a:solidFill>
+                <a:latin typeface="+mn-lt"/>
+              </a:defRPr>
+            </a:lvl6pPr>
+            <a:lvl7pPr marL="8782050" indent="-874713" algn="l" defTabSz="3495675" rtl="0" fontAlgn="base">
+              <a:spcBef>
+                <a:spcPct val="20000"/>
+              </a:spcBef>
+              <a:spcAft>
+                <a:spcPct val="0"/>
+              </a:spcAft>
+              <a:buChar char="»"/>
+              <a:defRPr sz="6400">
+                <a:solidFill>
+                  <a:schemeClr val="tx1"/>
+                </a:solidFill>
+                <a:latin typeface="+mn-lt"/>
+              </a:defRPr>
+            </a:lvl7pPr>
+            <a:lvl8pPr marL="9239250" indent="-874713" algn="l" defTabSz="3495675" rtl="0" fontAlgn="base">
+              <a:spcBef>
+                <a:spcPct val="20000"/>
+              </a:spcBef>
+              <a:spcAft>
+                <a:spcPct val="0"/>
+              </a:spcAft>
+              <a:buChar char="»"/>
+              <a:defRPr sz="6400">
+                <a:solidFill>
+                  <a:schemeClr val="tx1"/>
+                </a:solidFill>
+                <a:latin typeface="+mn-lt"/>
+              </a:defRPr>
+            </a:lvl8pPr>
+            <a:lvl9pPr marL="9696450" indent="-874713" algn="l" defTabSz="3495675" rtl="0" fontAlgn="base">
+              <a:spcBef>
+                <a:spcPct val="20000"/>
+              </a:spcBef>
+              <a:spcAft>
+                <a:spcPct val="0"/>
+              </a:spcAft>
+              <a:buChar char="»"/>
+              <a:defRPr sz="6400">
+                <a:solidFill>
+                  <a:schemeClr val="tx1"/>
+                </a:solidFill>
+                <a:latin typeface="+mn-lt"/>
+              </a:defRPr>
+            </a:lvl9pPr>
+          </a:lstStyle>
+          <a:p>
+            <a:pPr lvl="1"/>
+            <a:r>
+              <a:rPr lang="sv-SE" sz="8000" dirty="0" smtClean="0"/>
+              <a:t>Repeat</a:t>
+            </a:r>
+            <a:endParaRPr lang="sv-SE" sz="9200" dirty="0"/>
           </a:p>
         </p:txBody>
       </p:sp>
@@ -10133,6 +10744,186 @@
                                           </p:stCondLst>
                                         </p:cTn>
                                         <p:tgtEl>
+                                          <p:spTgt spid="16"/>
+                                        </p:tgtEl>
+                                        <p:attrNameLst>
+                                          <p:attrName>style.visibility</p:attrName>
+                                        </p:attrNameLst>
+                                      </p:cBhvr>
+                                      <p:to>
+                                        <p:strVal val="visible"/>
+                                      </p:to>
+                                    </p:set>
+                                  </p:childTnLst>
+                                </p:cTn>
+                              </p:par>
+                              <p:par>
+                                <p:cTn id="7" presetID="1" presetClass="entr" presetSubtype="0" fill="hold" nodeType="withEffect">
+                                  <p:stCondLst>
+                                    <p:cond delay="0"/>
+                                  </p:stCondLst>
+                                  <p:childTnLst>
+                                    <p:set>
+                                      <p:cBhvr>
+                                        <p:cTn id="8" dur="1" fill="hold">
+                                          <p:stCondLst>
+                                            <p:cond delay="0"/>
+                                          </p:stCondLst>
+                                        </p:cTn>
+                                        <p:tgtEl>
+                                          <p:spTgt spid="20"/>
+                                        </p:tgtEl>
+                                        <p:attrNameLst>
+                                          <p:attrName>style.visibility</p:attrName>
+                                        </p:attrNameLst>
+                                      </p:cBhvr>
+                                      <p:to>
+                                        <p:strVal val="visible"/>
+                                      </p:to>
+                                    </p:set>
+                                  </p:childTnLst>
+                                </p:cTn>
+                              </p:par>
+                              <p:par>
+                                <p:cTn id="9" presetID="1" presetClass="entr" presetSubtype="0" fill="hold" nodeType="withEffect">
+                                  <p:stCondLst>
+                                    <p:cond delay="0"/>
+                                  </p:stCondLst>
+                                  <p:childTnLst>
+                                    <p:set>
+                                      <p:cBhvr>
+                                        <p:cTn id="10" dur="1" fill="hold">
+                                          <p:stCondLst>
+                                            <p:cond delay="0"/>
+                                          </p:stCondLst>
+                                        </p:cTn>
+                                        <p:tgtEl>
+                                          <p:spTgt spid="21"/>
+                                        </p:tgtEl>
+                                        <p:attrNameLst>
+                                          <p:attrName>style.visibility</p:attrName>
+                                        </p:attrNameLst>
+                                      </p:cBhvr>
+                                      <p:to>
+                                        <p:strVal val="visible"/>
+                                      </p:to>
+                                    </p:set>
+                                  </p:childTnLst>
+                                </p:cTn>
+                              </p:par>
+                              <p:par>
+                                <p:cTn id="11" presetID="1" presetClass="entr" presetSubtype="0" fill="hold" nodeType="withEffect">
+                                  <p:stCondLst>
+                                    <p:cond delay="0"/>
+                                  </p:stCondLst>
+                                  <p:childTnLst>
+                                    <p:set>
+                                      <p:cBhvr>
+                                        <p:cTn id="12" dur="1" fill="hold">
+                                          <p:stCondLst>
+                                            <p:cond delay="0"/>
+                                          </p:stCondLst>
+                                        </p:cTn>
+                                        <p:tgtEl>
+                                          <p:spTgt spid="26"/>
+                                        </p:tgtEl>
+                                        <p:attrNameLst>
+                                          <p:attrName>style.visibility</p:attrName>
+                                        </p:attrNameLst>
+                                      </p:cBhvr>
+                                      <p:to>
+                                        <p:strVal val="visible"/>
+                                      </p:to>
+                                    </p:set>
+                                  </p:childTnLst>
+                                </p:cTn>
+                              </p:par>
+                              <p:par>
+                                <p:cTn id="13" presetID="1" presetClass="entr" presetSubtype="0" fill="hold" grpId="0" nodeType="withEffect">
+                                  <p:stCondLst>
+                                    <p:cond delay="0"/>
+                                  </p:stCondLst>
+                                  <p:childTnLst>
+                                    <p:set>
+                                      <p:cBhvr>
+                                        <p:cTn id="14" dur="1" fill="hold">
+                                          <p:stCondLst>
+                                            <p:cond delay="0"/>
+                                          </p:stCondLst>
+                                        </p:cTn>
+                                        <p:tgtEl>
+                                          <p:spTgt spid="6"/>
+                                        </p:tgtEl>
+                                        <p:attrNameLst>
+                                          <p:attrName>style.visibility</p:attrName>
+                                        </p:attrNameLst>
+                                      </p:cBhvr>
+                                      <p:to>
+                                        <p:strVal val="visible"/>
+                                      </p:to>
+                                    </p:set>
+                                  </p:childTnLst>
+                                </p:cTn>
+                              </p:par>
+                              <p:par>
+                                <p:cTn id="15" presetID="1" presetClass="entr" presetSubtype="0" fill="hold" grpId="0" nodeType="withEffect">
+                                  <p:stCondLst>
+                                    <p:cond delay="0"/>
+                                  </p:stCondLst>
+                                  <p:childTnLst>
+                                    <p:set>
+                                      <p:cBhvr>
+                                        <p:cTn id="16" dur="1" fill="hold">
+                                          <p:stCondLst>
+                                            <p:cond delay="0"/>
+                                          </p:stCondLst>
+                                        </p:cTn>
+                                        <p:tgtEl>
+                                          <p:spTgt spid="7"/>
+                                        </p:tgtEl>
+                                        <p:attrNameLst>
+                                          <p:attrName>style.visibility</p:attrName>
+                                        </p:attrNameLst>
+                                      </p:cBhvr>
+                                      <p:to>
+                                        <p:strVal val="visible"/>
+                                      </p:to>
+                                    </p:set>
+                                  </p:childTnLst>
+                                </p:cTn>
+                              </p:par>
+                            </p:childTnLst>
+                          </p:cTn>
+                        </p:par>
+                      </p:childTnLst>
+                    </p:cTn>
+                  </p:par>
+                  <p:par>
+                    <p:cTn id="17" fill="hold">
+                      <p:stCondLst>
+                        <p:cond delay="indefinite"/>
+                      </p:stCondLst>
+                      <p:childTnLst>
+                        <p:par>
+                          <p:cTn id="18" fill="hold">
+                            <p:stCondLst>
+                              <p:cond delay="0"/>
+                            </p:stCondLst>
+                            <p:childTnLst>
+                              <p:par>
+                                <p:cTn id="19" presetID="1" presetClass="entr" presetSubtype="0" fill="hold" grpId="0" nodeType="clickEffect">
+                                  <p:stCondLst>
+                                    <p:cond delay="0"/>
+                                  </p:stCondLst>
+                                  <p:childTnLst>
+                                    <p:set>
+                                      <p:cBhvr>
+                                        <p:cTn id="20" dur="1" fill="hold">
+                                          <p:stCondLst>
+                                            <p:cond delay="0"/>
+                                          </p:stCondLst>
+                                        </p:cTn>
+                                        <p:tgtEl>
                                           <p:spTgt spid="4"/>
                                         </p:tgtEl>
                                         <p:attrNameLst>
@@ -10147,14 +10938,14 @@
                                 </p:cTn>
                               </p:par>
                               <p:par>
-                                <p:cTn id="7" presetID="1" presetClass="entr" presetSubtype="0" fill="hold" grpId="0" nodeType="withEffect">
+                                <p:cTn id="21" presetID="1" presetClass="entr" presetSubtype="0" fill="hold" grpId="0" nodeType="withEffect">
                                   <p:stCondLst>
                                     <p:cond delay="0"/>
                                   </p:stCondLst>
                                   <p:childTnLst>
                                     <p:set>
                                       <p:cBhvr>
-                                        <p:cTn id="8" dur="1" fill="hold">
+                                        <p:cTn id="22" dur="1" fill="hold">
                                           <p:stCondLst>
                                             <p:cond delay="0"/>
                                           </p:stCondLst>
@@ -10174,20 +10965,47 @@
                                 </p:cTn>
                               </p:par>
                               <p:par>
-                                <p:cTn id="9" presetID="1" presetClass="entr" presetSubtype="0" fill="hold" grpId="0" nodeType="withEffect">
+                                <p:cTn id="23" presetID="1" presetClass="entr" presetSubtype="0" fill="hold" grpId="0" nodeType="withEffect">
                                   <p:stCondLst>
                                     <p:cond delay="0"/>
                                   </p:stCondLst>
                                   <p:childTnLst>
                                     <p:set>
                                       <p:cBhvr>
-                                        <p:cTn id="10" dur="1" fill="hold">
+                                        <p:cTn id="24" dur="1" fill="hold">
                                           <p:stCondLst>
                                             <p:cond delay="0"/>
                                           </p:stCondLst>
                                         </p:cTn>
                                         <p:tgtEl>
                                           <p:spTgt spid="13"/>
+                                        </p:tgtEl>
+                                        <p:attrNameLst>
+                                          <p:attrName>style.visibility</p:attrName>
+                                        </p:attrNameLst>
+                                      </p:cBhvr>
+                                      <p:to>
+                                        <p:strVal val="visible"/>
+                                      </p:to>
+                                    </p:set>
+                                  </p:childTnLst>
+                                </p:cTn>
+                              </p:par>
+                              <p:par>
+                                <p:cTn id="25" presetID="1" presetClass="entr" presetSubtype="0" fill="hold" grpId="0" nodeType="withEffect">
+                                  <p:stCondLst>
+                                    <p:cond delay="0"/>
+                                  </p:stCondLst>
+                                  <p:childTnLst>
+                                    <p:set>
+                                      <p:cBhvr>
+                                        <p:cTn id="26" dur="1" fill="hold">
+                                          <p:stCondLst>
+                                            <p:cond delay="0"/>
+                                          </p:stCondLst>
+                                        </p:cTn>
+                                        <p:tgtEl>
+                                          <p:spTgt spid="15"/>
                                         </p:tgtEl>
                                         <p:attrNameLst>
                                           <p:attrName>style.visibility</p:attrName>
@@ -10207,26 +11025,26 @@
                     </p:cTn>
                   </p:par>
                   <p:par>
-                    <p:cTn id="11" fill="hold">
+                    <p:cTn id="27" fill="hold">
                       <p:stCondLst>
                         <p:cond delay="indefinite"/>
                       </p:stCondLst>
                       <p:childTnLst>
                         <p:par>
-                          <p:cTn id="12" fill="hold">
+                          <p:cTn id="28" fill="hold">
                             <p:stCondLst>
                               <p:cond delay="0"/>
                             </p:stCondLst>
                             <p:childTnLst>
                               <p:par>
-                                <p:cTn id="13" presetID="1" presetClass="entr" presetSubtype="0" fill="hold" grpId="0" nodeType="clickEffect">
+                                <p:cTn id="29" presetID="1" presetClass="entr" presetSubtype="0" fill="hold" grpId="0" nodeType="clickEffect">
                                   <p:stCondLst>
                                     <p:cond delay="0"/>
                                   </p:stCondLst>
                                   <p:childTnLst>
                                     <p:set>
                                       <p:cBhvr>
-                                        <p:cTn id="14" dur="1" fill="hold">
+                                        <p:cTn id="30" dur="1" fill="hold">
                                           <p:stCondLst>
                                             <p:cond delay="0"/>
                                           </p:stCondLst>
@@ -10246,14 +11064,41 @@
                                 </p:cTn>
                               </p:par>
                               <p:par>
-                                <p:cTn id="15" presetID="1" presetClass="entr" presetSubtype="0" fill="hold" nodeType="withEffect">
+                                <p:cTn id="31" presetID="1" presetClass="entr" presetSubtype="0" fill="hold" grpId="0" nodeType="withEffect">
                                   <p:stCondLst>
                                     <p:cond delay="0"/>
                                   </p:stCondLst>
                                   <p:childTnLst>
                                     <p:set>
                                       <p:cBhvr>
-                                        <p:cTn id="16" dur="1" fill="hold">
+                                        <p:cTn id="32" dur="1" fill="hold">
+                                          <p:stCondLst>
+                                            <p:cond delay="0"/>
+                                          </p:stCondLst>
+                                        </p:cTn>
+                                        <p:tgtEl>
+                                          <p:spTgt spid="14"/>
+                                        </p:tgtEl>
+                                        <p:attrNameLst>
+                                          <p:attrName>style.visibility</p:attrName>
+                                        </p:attrNameLst>
+                                      </p:cBhvr>
+                                      <p:to>
+                                        <p:strVal val="visible"/>
+                                      </p:to>
+                                    </p:set>
+                                  </p:childTnLst>
+                                </p:cTn>
+                              </p:par>
+                              <p:par>
+                                <p:cTn id="33" presetID="1" presetClass="entr" presetSubtype="0" fill="hold" nodeType="withEffect">
+                                  <p:stCondLst>
+                                    <p:cond delay="0"/>
+                                  </p:stCondLst>
+                                  <p:childTnLst>
+                                    <p:set>
+                                      <p:cBhvr>
+                                        <p:cTn id="34" dur="1" fill="hold">
                                           <p:stCondLst>
                                             <p:cond delay="0"/>
                                           </p:stCondLst>
@@ -10273,20 +11118,20 @@
                                 </p:cTn>
                               </p:par>
                               <p:par>
-                                <p:cTn id="17" presetID="1" presetClass="entr" presetSubtype="0" fill="hold" grpId="0" nodeType="withEffect">
+                                <p:cTn id="35" presetID="1" presetClass="entr" presetSubtype="0" fill="hold" grpId="0" nodeType="withEffect">
                                   <p:stCondLst>
                                     <p:cond delay="0"/>
                                   </p:stCondLst>
                                   <p:childTnLst>
                                     <p:set>
                                       <p:cBhvr>
-                                        <p:cTn id="18" dur="1" fill="hold">
+                                        <p:cTn id="36" dur="1" fill="hold">
                                           <p:stCondLst>
                                             <p:cond delay="0"/>
                                           </p:stCondLst>
                                         </p:cTn>
                                         <p:tgtEl>
-                                          <p:spTgt spid="14"/>
+                                          <p:spTgt spid="17"/>
                                         </p:tgtEl>
                                         <p:attrNameLst>
                                           <p:attrName>style.visibility</p:attrName>
@@ -10329,9 +11174,14 @@
     <p:bldLst>
       <p:bldP spid="4" grpId="0"/>
       <p:bldP spid="5" grpId="0" animBg="1"/>
+      <p:bldP spid="6" grpId="0"/>
       <p:bldP spid="10" grpId="0" animBg="1"/>
+      <p:bldP spid="7" grpId="0"/>
       <p:bldP spid="13" grpId="0"/>
       <p:bldP spid="14" grpId="0"/>
+      <p:bldP spid="15" grpId="0"/>
+      <p:bldP spid="16" grpId="0"/>
+      <p:bldP spid="17" grpId="0"/>
     </p:bldLst>
   </p:timing>
 </p:sld>

</xml_diff>